<commit_message>
Retoques a las diapositivas
</commit_message>
<xml_diff>
--- a/00 - Presentacion/Data Divers - Presentacion v3.pptx
+++ b/00 - Presentacion/Data Divers - Presentacion v3.pptx
@@ -5,7 +5,7 @@
     <p:sldMasterId id="2147483651" r:id="rId1"/>
   </p:sldMasterIdLst>
   <p:notesMasterIdLst>
-    <p:notesMasterId r:id="rId27"/>
+    <p:notesMasterId r:id="rId28"/>
   </p:notesMasterIdLst>
   <p:sldIdLst>
     <p:sldId id="256" r:id="rId2"/>
@@ -24,32 +24,33 @@
     <p:sldId id="307" r:id="rId15"/>
     <p:sldId id="316" r:id="rId16"/>
     <p:sldId id="309" r:id="rId17"/>
-    <p:sldId id="328" r:id="rId18"/>
-    <p:sldId id="329" r:id="rId19"/>
-    <p:sldId id="310" r:id="rId20"/>
-    <p:sldId id="331" r:id="rId21"/>
-    <p:sldId id="332" r:id="rId22"/>
-    <p:sldId id="311" r:id="rId23"/>
-    <p:sldId id="313" r:id="rId24"/>
-    <p:sldId id="317" r:id="rId25"/>
-    <p:sldId id="302" r:id="rId26"/>
+    <p:sldId id="329" r:id="rId18"/>
+    <p:sldId id="333" r:id="rId19"/>
+    <p:sldId id="334" r:id="rId20"/>
+    <p:sldId id="310" r:id="rId21"/>
+    <p:sldId id="331" r:id="rId22"/>
+    <p:sldId id="332" r:id="rId23"/>
+    <p:sldId id="311" r:id="rId24"/>
+    <p:sldId id="313" r:id="rId25"/>
+    <p:sldId id="317" r:id="rId26"/>
+    <p:sldId id="302" r:id="rId27"/>
   </p:sldIdLst>
   <p:sldSz cx="9144000" cy="5143500" type="screen16x9"/>
   <p:notesSz cx="6858000" cy="9144000"/>
   <p:embeddedFontLst>
     <p:embeddedFont>
       <p:font typeface="Helvetica Neue Light" panose="020B0604020202020204" charset="0"/>
-      <p:regular r:id="rId28"/>
-      <p:bold r:id="rId29"/>
-      <p:italic r:id="rId30"/>
-      <p:boldItalic r:id="rId31"/>
+      <p:regular r:id="rId29"/>
+      <p:bold r:id="rId30"/>
+      <p:italic r:id="rId31"/>
+      <p:boldItalic r:id="rId32"/>
     </p:embeddedFont>
     <p:embeddedFont>
       <p:font typeface="Roboto" panose="02000000000000000000" pitchFamily="2" charset="0"/>
-      <p:regular r:id="rId32"/>
-      <p:bold r:id="rId33"/>
-      <p:italic r:id="rId34"/>
-      <p:boldItalic r:id="rId35"/>
+      <p:regular r:id="rId33"/>
+      <p:bold r:id="rId34"/>
+      <p:italic r:id="rId35"/>
+      <p:boldItalic r:id="rId36"/>
     </p:embeddedFont>
   </p:embeddedFontLst>
   <p:defaultTextStyle>
@@ -1863,7 +1864,7 @@
     </p:spTree>
     <p:extLst>
       <p:ext uri="{BB962C8B-B14F-4D97-AF65-F5344CB8AC3E}">
-        <p14:creationId xmlns:p14="http://schemas.microsoft.com/office/powerpoint/2010/main" val="2531831344"/>
+        <p14:creationId xmlns:p14="http://schemas.microsoft.com/office/powerpoint/2010/main" val="262079087"/>
       </p:ext>
     </p:extLst>
   </p:cSld>
@@ -1972,7 +1973,7 @@
     </p:spTree>
     <p:extLst>
       <p:ext uri="{BB962C8B-B14F-4D97-AF65-F5344CB8AC3E}">
-        <p14:creationId xmlns:p14="http://schemas.microsoft.com/office/powerpoint/2010/main" val="262079087"/>
+        <p14:creationId xmlns:p14="http://schemas.microsoft.com/office/powerpoint/2010/main" val="1279055423"/>
       </p:ext>
     </p:extLst>
   </p:cSld>
@@ -2081,7 +2082,7 @@
     </p:spTree>
     <p:extLst>
       <p:ext uri="{BB962C8B-B14F-4D97-AF65-F5344CB8AC3E}">
-        <p14:creationId xmlns:p14="http://schemas.microsoft.com/office/powerpoint/2010/main" val="1372754735"/>
+        <p14:creationId xmlns:p14="http://schemas.microsoft.com/office/powerpoint/2010/main" val="3362047615"/>
       </p:ext>
     </p:extLst>
   </p:cSld>
@@ -2294,7 +2295,7 @@
     </p:spTree>
     <p:extLst>
       <p:ext uri="{BB962C8B-B14F-4D97-AF65-F5344CB8AC3E}">
-        <p14:creationId xmlns:p14="http://schemas.microsoft.com/office/powerpoint/2010/main" val="2060903882"/>
+        <p14:creationId xmlns:p14="http://schemas.microsoft.com/office/powerpoint/2010/main" val="1372754735"/>
       </p:ext>
     </p:extLst>
   </p:cSld>
@@ -2403,7 +2404,7 @@
     </p:spTree>
     <p:extLst>
       <p:ext uri="{BB962C8B-B14F-4D97-AF65-F5344CB8AC3E}">
-        <p14:creationId xmlns:p14="http://schemas.microsoft.com/office/powerpoint/2010/main" val="2051865850"/>
+        <p14:creationId xmlns:p14="http://schemas.microsoft.com/office/powerpoint/2010/main" val="2060903882"/>
       </p:ext>
     </p:extLst>
   </p:cSld>
@@ -2512,7 +2513,7 @@
     </p:spTree>
     <p:extLst>
       <p:ext uri="{BB962C8B-B14F-4D97-AF65-F5344CB8AC3E}">
-        <p14:creationId xmlns:p14="http://schemas.microsoft.com/office/powerpoint/2010/main" val="2558417195"/>
+        <p14:creationId xmlns:p14="http://schemas.microsoft.com/office/powerpoint/2010/main" val="2051865850"/>
       </p:ext>
     </p:extLst>
   </p:cSld>
@@ -2621,7 +2622,7 @@
     </p:spTree>
     <p:extLst>
       <p:ext uri="{BB962C8B-B14F-4D97-AF65-F5344CB8AC3E}">
-        <p14:creationId xmlns:p14="http://schemas.microsoft.com/office/powerpoint/2010/main" val="3511361781"/>
+        <p14:creationId xmlns:p14="http://schemas.microsoft.com/office/powerpoint/2010/main" val="2558417195"/>
       </p:ext>
     </p:extLst>
   </p:cSld>
@@ -2730,6 +2731,115 @@
     </p:spTree>
     <p:extLst>
       <p:ext uri="{BB962C8B-B14F-4D97-AF65-F5344CB8AC3E}">
+        <p14:creationId xmlns:p14="http://schemas.microsoft.com/office/powerpoint/2010/main" val="3511361781"/>
+      </p:ext>
+    </p:extLst>
+  </p:cSld>
+  <p:clrMapOvr>
+    <a:masterClrMapping/>
+  </p:clrMapOvr>
+</p:notes>
+</file>
+
+<file path=ppt/notesSlides/notesSlide25.xml><?xml version="1.0" encoding="utf-8"?>
+<p:notes xmlns:a="http://schemas.openxmlformats.org/drawingml/2006/main" xmlns:r="http://schemas.openxmlformats.org/officeDocument/2006/relationships" xmlns:p="http://schemas.openxmlformats.org/presentationml/2006/main" showMasterSp="0" showMasterPhAnim="0">
+  <p:cSld>
+    <p:spTree>
+      <p:nvGrpSpPr>
+        <p:cNvPr id="1" name="Shape 21"/>
+        <p:cNvGrpSpPr/>
+        <p:nvPr/>
+      </p:nvGrpSpPr>
+      <p:grpSpPr>
+        <a:xfrm>
+          <a:off x="0" y="0"/>
+          <a:ext cx="0" cy="0"/>
+          <a:chOff x="0" y="0"/>
+          <a:chExt cx="0" cy="0"/>
+        </a:xfrm>
+      </p:grpSpPr>
+      <p:sp>
+        <p:nvSpPr>
+          <p:cNvPr id="22" name="Google Shape;22;p2:notes"/>
+          <p:cNvSpPr txBox="1">
+            <a:spLocks noGrp="1"/>
+          </p:cNvSpPr>
+          <p:nvPr>
+            <p:ph type="body" idx="1"/>
+          </p:nvPr>
+        </p:nvSpPr>
+        <p:spPr>
+          <a:xfrm>
+            <a:off x="685800" y="4343400"/>
+            <a:ext cx="5486400" cy="4114800"/>
+          </a:xfrm>
+          <a:prstGeom prst="rect">
+            <a:avLst/>
+          </a:prstGeom>
+        </p:spPr>
+        <p:txBody>
+          <a:bodyPr spcFirstLastPara="1" wrap="square" lIns="91425" tIns="91425" rIns="91425" bIns="91425" anchor="t" anchorCtr="0">
+            <a:noAutofit/>
+          </a:bodyPr>
+          <a:lstStyle/>
+          <a:p>
+            <a:pPr marL="0" lvl="0" indent="0" algn="l" rtl="0">
+              <a:spcBef>
+                <a:spcPts val="0"/>
+              </a:spcBef>
+              <a:spcAft>
+                <a:spcPts val="0"/>
+              </a:spcAft>
+              <a:buNone/>
+            </a:pPr>
+            <a:endParaRPr dirty="0"/>
+          </a:p>
+        </p:txBody>
+      </p:sp>
+      <p:sp>
+        <p:nvSpPr>
+          <p:cNvPr id="23" name="Google Shape;23;p2:notes"/>
+          <p:cNvSpPr>
+            <a:spLocks noGrp="1" noRot="1" noChangeAspect="1"/>
+          </p:cNvSpPr>
+          <p:nvPr>
+            <p:ph type="sldImg" idx="2"/>
+          </p:nvPr>
+        </p:nvSpPr>
+        <p:spPr>
+          <a:xfrm>
+            <a:off x="381000" y="685800"/>
+            <a:ext cx="6096000" cy="3429000"/>
+          </a:xfrm>
+          <a:custGeom>
+            <a:avLst/>
+            <a:gdLst/>
+            <a:ahLst/>
+            <a:cxnLst/>
+            <a:rect l="l" t="t" r="r" b="b"/>
+            <a:pathLst>
+              <a:path w="120000" h="120000" extrusionOk="0">
+                <a:moveTo>
+                  <a:pt x="0" y="0"/>
+                </a:moveTo>
+                <a:lnTo>
+                  <a:pt x="120000" y="0"/>
+                </a:lnTo>
+                <a:lnTo>
+                  <a:pt x="120000" y="120000"/>
+                </a:lnTo>
+                <a:lnTo>
+                  <a:pt x="0" y="120000"/>
+                </a:lnTo>
+                <a:close/>
+              </a:path>
+            </a:pathLst>
+          </a:custGeom>
+        </p:spPr>
+      </p:sp>
+    </p:spTree>
+    <p:extLst>
+      <p:ext uri="{BB962C8B-B14F-4D97-AF65-F5344CB8AC3E}">
         <p14:creationId xmlns:p14="http://schemas.microsoft.com/office/powerpoint/2010/main" val="2014265877"/>
       </p:ext>
     </p:extLst>
@@ -2740,7 +2850,7 @@
 </p:notes>
 </file>
 
-<file path=ppt/notesSlides/notesSlide25.xml><?xml version="1.0" encoding="utf-8"?>
+<file path=ppt/notesSlides/notesSlide26.xml><?xml version="1.0" encoding="utf-8"?>
 <p:notes xmlns:a="http://schemas.openxmlformats.org/drawingml/2006/main" xmlns:r="http://schemas.openxmlformats.org/officeDocument/2006/relationships" xmlns:p="http://schemas.openxmlformats.org/presentationml/2006/main" showMasterSp="0" showMasterPhAnim="0">
   <p:cSld>
     <p:spTree>
@@ -9518,7 +9628,7 @@
         <p:spPr>
           <a:xfrm>
             <a:off x="670314" y="729736"/>
-            <a:ext cx="8016240" cy="4126761"/>
+            <a:ext cx="8016240" cy="3085450"/>
           </a:xfrm>
           <a:prstGeom prst="rect">
             <a:avLst/>
@@ -9636,24 +9746,6 @@
             </a:r>
           </a:p>
           <a:p>
-            <a:pPr marL="238125" marR="58579" indent="-228600" algn="just">
-              <a:lnSpc>
-                <a:spcPct val="200000"/>
-              </a:lnSpc>
-              <a:spcBef>
-                <a:spcPts val="180"/>
-              </a:spcBef>
-              <a:buFont typeface="+mj-lt"/>
-              <a:buAutoNum type="arabicPeriod"/>
-            </a:pPr>
-            <a:r>
-              <a:rPr lang="es-MX" sz="1200" b="1" dirty="0">
-                <a:latin typeface="Helvetica Neue Light"/>
-              </a:rPr>
-              <a:t>Inicialización y Entrenamiento:</a:t>
-            </a:r>
-          </a:p>
-          <a:p>
             <a:pPr marL="742950" lvl="1" indent="-285750">
               <a:buFont typeface="Arial" panose="020B0604020202020204" pitchFamily="34" charset="0"/>
               <a:buChar char="•"/>
@@ -9668,56 +9760,8 @@
                 </a:highlight>
                 <a:latin typeface="ui-sans-serif"/>
               </a:rPr>
-              <a:t>Definición de Parámetros: Tamaño de vector, contexto de ventana, frecuencia mínima de palabras.</a:t>
-            </a:r>
-          </a:p>
-          <a:p>
-            <a:pPr marL="742950" lvl="1" indent="-285750">
-              <a:buFont typeface="Arial" panose="020B0604020202020204" pitchFamily="34" charset="0"/>
-              <a:buChar char="•"/>
-            </a:pPr>
-            <a:r>
-              <a:rPr lang="es-MX" dirty="0">
-                <a:solidFill>
-                  <a:srgbClr val="0D0D0D"/>
-                </a:solidFill>
-                <a:highlight>
-                  <a:srgbClr val="FFFFFF"/>
-                </a:highlight>
-                <a:latin typeface="ui-sans-serif"/>
-              </a:rPr>
-              <a:t>Construcción del Vocabulario: A partir de un corpus preprocesado y tokenizado.</a:t>
-            </a:r>
-          </a:p>
-          <a:p>
-            <a:pPr marL="742950" lvl="1" indent="-285750">
-              <a:buFont typeface="Arial" panose="020B0604020202020204" pitchFamily="34" charset="0"/>
-              <a:buChar char="•"/>
-            </a:pPr>
-            <a:r>
-              <a:rPr lang="es-MX" dirty="0">
-                <a:solidFill>
-                  <a:srgbClr val="0D0D0D"/>
-                </a:solidFill>
-                <a:highlight>
-                  <a:srgbClr val="FFFFFF"/>
-                </a:highlight>
-                <a:latin typeface="ui-sans-serif"/>
-              </a:rPr>
-              <a:t>Entrenamiento del Modelo: Realizado durante 10 épocas para optimizar la representación vectorial del texto.</a:t>
-            </a:r>
-          </a:p>
-          <a:p>
-            <a:pPr marL="457200" lvl="1"/>
-            <a:endParaRPr lang="es-MX" dirty="0">
-              <a:solidFill>
-                <a:srgbClr val="0D0D0D"/>
-              </a:solidFill>
-              <a:highlight>
-                <a:srgbClr val="FFFFFF"/>
-              </a:highlight>
-              <a:latin typeface="ui-sans-serif"/>
-            </a:endParaRPr>
+              <a:t>Nos sirvió como un análisis exploratorio más que para entender el texto, como sí nos ayudaron los dos puntos anteriores.</a:t>
+            </a:r>
           </a:p>
         </p:txBody>
       </p:sp>
@@ -9759,7 +9803,7 @@
         </p:nvSpPr>
         <p:spPr>
           <a:xfrm>
-            <a:off x="662940" y="585145"/>
+            <a:off x="670313" y="407229"/>
             <a:ext cx="4572000" cy="338554"/>
           </a:xfrm>
           <a:prstGeom prst="rect">
@@ -9826,8 +9870,8 @@
         </p:nvSpPr>
         <p:spPr>
           <a:xfrm>
-            <a:off x="670314" y="923699"/>
-            <a:ext cx="8016240" cy="3054672"/>
+            <a:off x="545623" y="745783"/>
+            <a:ext cx="8377821" cy="3812572"/>
           </a:xfrm>
           <a:prstGeom prst="rect">
             <a:avLst/>
@@ -9843,93 +9887,347 @@
           </a:bodyPr>
           <a:lstStyle/>
           <a:p>
-            <a:pPr marL="9525" marR="58579" algn="just">
+            <a:pPr marR="58579" lvl="1" algn="just">
               <a:lnSpc>
-                <a:spcPct val="200000"/>
+                <a:spcPct val="150000"/>
               </a:lnSpc>
               <a:spcBef>
                 <a:spcPts val="180"/>
               </a:spcBef>
             </a:pPr>
             <a:r>
-              <a:rPr lang="es-MX" sz="1600" b="1" dirty="0">
+              <a:rPr lang="es-MX" sz="1050" dirty="0">
                 <a:latin typeface="Helvetica Neue Light"/>
               </a:rPr>
-              <a:t>Word Embeddings con Word2Vec:</a:t>
-            </a:r>
-          </a:p>
-          <a:p>
-            <a:pPr marL="238125" marR="58579" indent="-228600" algn="just">
+              <a:t>Implementación de diferentes modelos de NLP.</a:t>
+            </a:r>
+          </a:p>
+          <a:p>
+            <a:pPr marR="58579" lvl="1" algn="just">
               <a:lnSpc>
-                <a:spcPct val="200000"/>
+                <a:spcPct val="150000"/>
               </a:lnSpc>
               <a:spcBef>
                 <a:spcPts val="180"/>
               </a:spcBef>
-              <a:buFont typeface="+mj-lt"/>
-              <a:buAutoNum type="arabicPeriod" startAt="2"/>
             </a:pPr>
             <a:r>
-              <a:rPr lang="es-MX" sz="1200" b="1" dirty="0">
+              <a:rPr lang="es-MX" sz="1050" dirty="0">
                 <a:latin typeface="Helvetica Neue Light"/>
               </a:rPr>
-              <a:t>O</a:t>
-            </a:r>
-            <a:r>
-              <a:rPr lang="es-UY" sz="1200" b="1" dirty="0">
+              <a:t>A. </a:t>
+            </a:r>
+            <a:r>
+              <a:rPr lang="es-MX" sz="1050" b="1" dirty="0">
                 <a:latin typeface="Helvetica Neue Light"/>
               </a:rPr>
-              <a:t>peraciones Post-Entrenamiento</a:t>
-            </a:r>
-            <a:r>
-              <a:rPr lang="es-MX" sz="1200" b="1" dirty="0">
+              <a:t>Modelo de Regresión Logística (</a:t>
+            </a:r>
+            <a:r>
+              <a:rPr lang="es-MX" sz="1050" b="1" dirty="0" err="1">
                 <a:latin typeface="Helvetica Neue Light"/>
               </a:rPr>
-              <a:t>:</a:t>
-            </a:r>
-          </a:p>
-          <a:p>
-            <a:pPr marL="742950" lvl="1" indent="-285750">
-              <a:buFont typeface="Arial" panose="020B0604020202020204" pitchFamily="34" charset="0"/>
-              <a:buChar char="•"/>
+              <a:t>Logistic</a:t>
+            </a:r>
+            <a:r>
+              <a:rPr lang="es-MX" sz="1050" b="1" dirty="0">
+                <a:latin typeface="Helvetica Neue Light"/>
+              </a:rPr>
+              <a:t> </a:t>
+            </a:r>
+            <a:r>
+              <a:rPr lang="es-MX" sz="1050" b="1" dirty="0" err="1">
+                <a:latin typeface="Helvetica Neue Light"/>
+              </a:rPr>
+              <a:t>Regression</a:t>
+            </a:r>
+            <a:r>
+              <a:rPr lang="es-MX" sz="1050" b="1" dirty="0">
+                <a:latin typeface="Helvetica Neue Light"/>
+              </a:rPr>
+              <a:t>)</a:t>
+            </a:r>
+            <a:r>
+              <a:rPr lang="es-MX" sz="1050" dirty="0">
+                <a:latin typeface="Helvetica Neue Light"/>
+              </a:rPr>
+              <a:t> El modelo de Regresión Logística se utiliza para la clasificación binaria. Calcula la probabilidad de que una observación pertenezca a una clase utilizando una función logística.</a:t>
+            </a:r>
+          </a:p>
+          <a:p>
+            <a:pPr marR="58579" lvl="1" algn="just">
+              <a:lnSpc>
+                <a:spcPct val="150000"/>
+              </a:lnSpc>
+              <a:spcBef>
+                <a:spcPts val="180"/>
+              </a:spcBef>
             </a:pPr>
             <a:r>
-              <a:rPr lang="es-MX" dirty="0">
-                <a:solidFill>
-                  <a:srgbClr val="0D0D0D"/>
-                </a:solidFill>
-                <a:highlight>
-                  <a:srgbClr val="FFFFFF"/>
-                </a:highlight>
-                <a:latin typeface="ui-sans-serif"/>
-              </a:rPr>
-              <a:t>Guardado y Carga: Modelo guardado como w2v_sg_model.pkl para reutilización futura sin reentrenamiento.</a:t>
-            </a:r>
-          </a:p>
-          <a:p>
-            <a:pPr marL="742950" lvl="1" indent="-285750">
-              <a:buFont typeface="Arial" panose="020B0604020202020204" pitchFamily="34" charset="0"/>
-              <a:buChar char="•"/>
+              <a:rPr lang="es-MX" sz="1050" dirty="0">
+                <a:latin typeface="Helvetica Neue Light"/>
+              </a:rPr>
+              <a:t>B. </a:t>
+            </a:r>
+            <a:r>
+              <a:rPr lang="es-MX" sz="1050" b="1" dirty="0">
+                <a:latin typeface="Helvetica Neue Light"/>
+              </a:rPr>
+              <a:t>Modelo de Clasificación </a:t>
+            </a:r>
+            <a:r>
+              <a:rPr lang="es-MX" sz="1050" b="1" dirty="0" err="1">
+                <a:latin typeface="Helvetica Neue Light"/>
+              </a:rPr>
+              <a:t>Gradient</a:t>
+            </a:r>
+            <a:r>
+              <a:rPr lang="es-MX" sz="1050" b="1" dirty="0">
+                <a:latin typeface="Helvetica Neue Light"/>
+              </a:rPr>
+              <a:t> </a:t>
+            </a:r>
+            <a:r>
+              <a:rPr lang="es-MX" sz="1050" b="1" dirty="0" err="1">
+                <a:latin typeface="Helvetica Neue Light"/>
+              </a:rPr>
+              <a:t>Boosting</a:t>
+            </a:r>
+            <a:r>
+              <a:rPr lang="es-MX" sz="1050" b="1" dirty="0">
+                <a:latin typeface="Helvetica Neue Light"/>
+              </a:rPr>
+              <a:t> </a:t>
+            </a:r>
+            <a:r>
+              <a:rPr lang="es-MX" sz="1050" dirty="0">
+                <a:latin typeface="Helvetica Neue Light"/>
+              </a:rPr>
+              <a:t>El modelo de Clasificación </a:t>
+            </a:r>
+            <a:r>
+              <a:rPr lang="es-MX" sz="1050" dirty="0" err="1">
+                <a:latin typeface="Helvetica Neue Light"/>
+              </a:rPr>
+              <a:t>Gradient</a:t>
+            </a:r>
+            <a:r>
+              <a:rPr lang="es-MX" sz="1050" dirty="0">
+                <a:latin typeface="Helvetica Neue Light"/>
+              </a:rPr>
+              <a:t> </a:t>
+            </a:r>
+            <a:r>
+              <a:rPr lang="es-MX" sz="1050" dirty="0" err="1">
+                <a:latin typeface="Helvetica Neue Light"/>
+              </a:rPr>
+              <a:t>Boosting</a:t>
+            </a:r>
+            <a:r>
+              <a:rPr lang="es-MX" sz="1050" dirty="0">
+                <a:latin typeface="Helvetica Neue Light"/>
+              </a:rPr>
+              <a:t> es un algoritmo de conjunto que combina múltiples árboles de decisión más débiles para construir un modelo predictivo más fuerte.</a:t>
+            </a:r>
+          </a:p>
+          <a:p>
+            <a:pPr marR="58579" lvl="1" algn="just">
+              <a:lnSpc>
+                <a:spcPct val="150000"/>
+              </a:lnSpc>
+              <a:spcBef>
+                <a:spcPts val="180"/>
+              </a:spcBef>
             </a:pPr>
             <a:r>
-              <a:rPr lang="es-MX" dirty="0">
-                <a:solidFill>
-                  <a:srgbClr val="0D0D0D"/>
-                </a:solidFill>
-                <a:highlight>
-                  <a:srgbClr val="FFFFFF"/>
-                </a:highlight>
-                <a:latin typeface="ui-sans-serif"/>
-              </a:rPr>
-              <a:t>Validación: Función print_sim_words para mostrar palabras semánticamente similares y validar la efectividad del modelo.</a:t>
-            </a:r>
-          </a:p>
-          <a:p>
-            <a:pPr marL="742950" lvl="1" indent="-285750">
-              <a:buFont typeface="Arial" panose="020B0604020202020204" pitchFamily="34" charset="0"/>
-              <a:buChar char="•"/>
+              <a:rPr lang="es-MX" sz="1050" dirty="0">
+                <a:latin typeface="Helvetica Neue Light"/>
+              </a:rPr>
+              <a:t>C. </a:t>
+            </a:r>
+            <a:r>
+              <a:rPr lang="es-MX" sz="1050" b="1" dirty="0">
+                <a:latin typeface="Helvetica Neue Light"/>
+              </a:rPr>
+              <a:t>Modelo de Deep </a:t>
+            </a:r>
+            <a:r>
+              <a:rPr lang="es-MX" sz="1050" b="1" dirty="0" err="1">
+                <a:latin typeface="Helvetica Neue Light"/>
+              </a:rPr>
+              <a:t>Learning</a:t>
+            </a:r>
+            <a:r>
+              <a:rPr lang="es-MX" sz="1050" b="1" dirty="0">
+                <a:latin typeface="Helvetica Neue Light"/>
+              </a:rPr>
+              <a:t> RNN </a:t>
+            </a:r>
+            <a:r>
+              <a:rPr lang="es-MX" sz="1050" dirty="0">
+                <a:latin typeface="Helvetica Neue Light"/>
+              </a:rPr>
+              <a:t>El modelo utiliza una red neuronal recurrente LSTM para procesar secuencias de texto, seguido de una capa densa de salida con activación sigmoide para clasificación binaria, y se compila con la función de pérdida de entropía cruzada binaria y el optimizador Adam.</a:t>
+            </a:r>
+          </a:p>
+          <a:p>
+            <a:pPr marR="58579" lvl="1" algn="just">
+              <a:lnSpc>
+                <a:spcPct val="150000"/>
+              </a:lnSpc>
+              <a:spcBef>
+                <a:spcPts val="180"/>
+              </a:spcBef>
             </a:pPr>
-            <a:endParaRPr lang="es-MX" dirty="0">
+            <a:r>
+              <a:rPr lang="es-MX" sz="1050" dirty="0">
+                <a:latin typeface="Helvetica Neue Light"/>
+              </a:rPr>
+              <a:t>D. </a:t>
+            </a:r>
+            <a:r>
+              <a:rPr lang="es-MX" sz="1050" b="1" dirty="0">
+                <a:latin typeface="Helvetica Neue Light"/>
+              </a:rPr>
+              <a:t>Modelo de Regresión Logística TF-IDF: </a:t>
+            </a:r>
+            <a:r>
+              <a:rPr lang="es-MX" sz="1050" dirty="0">
+                <a:latin typeface="Helvetica Neue Light"/>
+              </a:rPr>
+              <a:t>En este caso, implementaremos la técnica de TF-IDF (</a:t>
+            </a:r>
+            <a:r>
+              <a:rPr lang="es-MX" sz="1050" dirty="0" err="1">
+                <a:latin typeface="Helvetica Neue Light"/>
+              </a:rPr>
+              <a:t>Term</a:t>
+            </a:r>
+            <a:r>
+              <a:rPr lang="es-MX" sz="1050" dirty="0">
+                <a:latin typeface="Helvetica Neue Light"/>
+              </a:rPr>
+              <a:t> </a:t>
+            </a:r>
+            <a:r>
+              <a:rPr lang="es-MX" sz="1050" dirty="0" err="1">
+                <a:latin typeface="Helvetica Neue Light"/>
+              </a:rPr>
+              <a:t>Frequency</a:t>
+            </a:r>
+            <a:r>
+              <a:rPr lang="es-MX" sz="1050" dirty="0">
+                <a:latin typeface="Helvetica Neue Light"/>
+              </a:rPr>
+              <a:t>-Inverse </a:t>
+            </a:r>
+            <a:r>
+              <a:rPr lang="es-MX" sz="1050" dirty="0" err="1">
+                <a:latin typeface="Helvetica Neue Light"/>
+              </a:rPr>
+              <a:t>Document</a:t>
+            </a:r>
+            <a:r>
+              <a:rPr lang="es-MX" sz="1050" dirty="0">
+                <a:latin typeface="Helvetica Neue Light"/>
+              </a:rPr>
+              <a:t> </a:t>
+            </a:r>
+            <a:r>
+              <a:rPr lang="es-MX" sz="1050" dirty="0" err="1">
+                <a:latin typeface="Helvetica Neue Light"/>
+              </a:rPr>
+              <a:t>Frequency</a:t>
+            </a:r>
+            <a:r>
+              <a:rPr lang="es-MX" sz="1050" dirty="0">
+                <a:latin typeface="Helvetica Neue Light"/>
+              </a:rPr>
+              <a:t>) en el modelo de regresión logística. TF-IDF asigna pesos a palabras según su frecuencia en un documento y su rareza en el conjunto de documentos, destacando términos importantes en el análisis de texto.</a:t>
+            </a:r>
+          </a:p>
+          <a:p>
+            <a:pPr marR="58579" lvl="1" algn="just">
+              <a:lnSpc>
+                <a:spcPct val="150000"/>
+              </a:lnSpc>
+              <a:spcBef>
+                <a:spcPts val="180"/>
+              </a:spcBef>
+            </a:pPr>
+            <a:r>
+              <a:rPr lang="es-MX" sz="1050" dirty="0">
+                <a:latin typeface="Helvetica Neue Light"/>
+              </a:rPr>
+              <a:t>E. </a:t>
+            </a:r>
+            <a:r>
+              <a:rPr lang="es-MX" sz="1050" b="1" dirty="0">
+                <a:latin typeface="Helvetica Neue Light"/>
+              </a:rPr>
+              <a:t>Modelo Basado en BERT </a:t>
+            </a:r>
+            <a:r>
+              <a:rPr lang="es-MX" sz="1050" dirty="0" err="1">
+                <a:latin typeface="Helvetica Neue Light"/>
+              </a:rPr>
+              <a:t>Bidirectional</a:t>
+            </a:r>
+            <a:r>
+              <a:rPr lang="es-MX" sz="1050" dirty="0">
+                <a:latin typeface="Helvetica Neue Light"/>
+              </a:rPr>
+              <a:t> </a:t>
+            </a:r>
+            <a:r>
+              <a:rPr lang="es-MX" sz="1050" dirty="0" err="1">
+                <a:latin typeface="Helvetica Neue Light"/>
+              </a:rPr>
+              <a:t>Encoder</a:t>
+            </a:r>
+            <a:r>
+              <a:rPr lang="es-MX" sz="1050" dirty="0">
+                <a:latin typeface="Helvetica Neue Light"/>
+              </a:rPr>
+              <a:t> </a:t>
+            </a:r>
+            <a:r>
+              <a:rPr lang="es-MX" sz="1050" dirty="0" err="1">
+                <a:latin typeface="Helvetica Neue Light"/>
+              </a:rPr>
+              <a:t>Representations</a:t>
+            </a:r>
+            <a:r>
+              <a:rPr lang="es-MX" sz="1050" dirty="0">
+                <a:latin typeface="Helvetica Neue Light"/>
+              </a:rPr>
+              <a:t> </a:t>
+            </a:r>
+            <a:r>
+              <a:rPr lang="es-MX" sz="1050" dirty="0" err="1">
+                <a:latin typeface="Helvetica Neue Light"/>
+              </a:rPr>
+              <a:t>from</a:t>
+            </a:r>
+            <a:r>
+              <a:rPr lang="es-MX" sz="1050" dirty="0">
+                <a:latin typeface="Helvetica Neue Light"/>
+              </a:rPr>
+              <a:t> Transformers (BERT) es un modelo de lenguaje basado en transformadores que </a:t>
+            </a:r>
+            <a:r>
+              <a:rPr lang="es-MX" sz="1050" dirty="0" err="1">
+                <a:latin typeface="Helvetica Neue Light"/>
+              </a:rPr>
+              <a:t>preentrena</a:t>
+            </a:r>
+            <a:r>
+              <a:rPr lang="es-MX" sz="1050" dirty="0">
+                <a:latin typeface="Helvetica Neue Light"/>
+              </a:rPr>
+              <a:t> representaciones de texto bidireccionales para comprender mejor el contexto de las palabras en una oración. Este modelo es especialmente interesante para nosotros, dado el alto nivel técnico de las sentencias de la corte, ya que su tipo de análisis podría generar una representación más fiable del caso de estudio.</a:t>
+            </a:r>
+            <a:endParaRPr lang="es-MX" sz="1050" dirty="0">
               <a:solidFill>
                 <a:srgbClr val="0D0D0D"/>
               </a:solidFill>
@@ -9939,60 +10237,12 @@
               <a:latin typeface="ui-sans-serif"/>
             </a:endParaRPr>
           </a:p>
-          <a:p>
-            <a:pPr marL="238125" marR="58579" indent="-228600" algn="just">
-              <a:lnSpc>
-                <a:spcPct val="200000"/>
-              </a:lnSpc>
-              <a:spcBef>
-                <a:spcPts val="180"/>
-              </a:spcBef>
-              <a:buFont typeface="+mj-lt"/>
-              <a:buAutoNum type="arabicPeriod" startAt="2"/>
-            </a:pPr>
-            <a:r>
-              <a:rPr lang="es-MX" sz="1200" b="1" dirty="0">
-                <a:latin typeface="Helvetica Neue Light"/>
-              </a:rPr>
-              <a:t>Visualización de Embeddings:</a:t>
-            </a:r>
-          </a:p>
-          <a:p>
-            <a:pPr marL="742950" lvl="1" indent="-285750">
-              <a:buFont typeface="Arial" panose="020B0604020202020204" pitchFamily="34" charset="0"/>
-              <a:buChar char="•"/>
-            </a:pPr>
-            <a:r>
-              <a:rPr lang="es-MX" dirty="0">
-                <a:solidFill>
-                  <a:srgbClr val="0D0D0D"/>
-                </a:solidFill>
-                <a:highlight>
-                  <a:srgbClr val="FFFFFF"/>
-                </a:highlight>
-                <a:latin typeface="ui-sans-serif"/>
-              </a:rPr>
-              <a:t>Representación en 2D: Gráfica que muestra la agrupación semántica de palabras clave y sus similares para una interpretación visual clara de la semántica.</a:t>
-            </a:r>
-          </a:p>
-          <a:p>
-            <a:pPr marL="457200" lvl="1"/>
-            <a:endParaRPr lang="es-MX" dirty="0">
-              <a:solidFill>
-                <a:srgbClr val="0D0D0D"/>
-              </a:solidFill>
-              <a:highlight>
-                <a:srgbClr val="FFFFFF"/>
-              </a:highlight>
-              <a:latin typeface="ui-sans-serif"/>
-            </a:endParaRPr>
-          </a:p>
         </p:txBody>
       </p:sp>
     </p:spTree>
     <p:extLst>
       <p:ext uri="{BB962C8B-B14F-4D97-AF65-F5344CB8AC3E}">
-        <p14:creationId xmlns:p14="http://schemas.microsoft.com/office/powerpoint/2010/main" val="475667956"/>
+        <p14:creationId xmlns:p14="http://schemas.microsoft.com/office/powerpoint/2010/main" val="1686361473"/>
       </p:ext>
     </p:extLst>
   </p:cSld>
@@ -10082,10 +10332,10 @@
       </p:sp>
       <p:sp>
         <p:nvSpPr>
-          <p:cNvPr id="2" name="Google Shape;26;p6">
+          <p:cNvPr id="3" name="Google Shape;27;p6">
             <a:extLst>
               <a:ext uri="{FF2B5EF4-FFF2-40B4-BE49-F238E27FC236}">
-                <a16:creationId xmlns:a16="http://schemas.microsoft.com/office/drawing/2014/main" id="{760DE103-6E6E-8BC0-9DF6-7993C9336394}"/>
+                <a16:creationId xmlns:a16="http://schemas.microsoft.com/office/drawing/2014/main" id="{BFC825DE-4693-FC17-AEA7-CA6D9453F4DE}"/>
               </a:ext>
             </a:extLst>
           </p:cNvPr>
@@ -10094,8 +10344,8 @@
         </p:nvSpPr>
         <p:spPr>
           <a:xfrm>
-            <a:off x="545623" y="745783"/>
-            <a:ext cx="8377821" cy="3812572"/>
+            <a:off x="2808193" y="843647"/>
+            <a:ext cx="3527614" cy="338554"/>
           </a:xfrm>
           <a:prstGeom prst="rect">
             <a:avLst/>
@@ -10106,359 +10356,513 @@
           </a:ln>
         </p:spPr>
         <p:txBody>
-          <a:bodyPr spcFirstLastPara="1" wrap="square" lIns="0" tIns="22850" rIns="0" bIns="0" anchor="t" anchorCtr="0">
+          <a:bodyPr spcFirstLastPara="1" wrap="square" lIns="91425" tIns="45700" rIns="91425" bIns="45700" anchor="t" anchorCtr="0">
             <a:spAutoFit/>
           </a:bodyPr>
           <a:lstStyle/>
           <a:p>
-            <a:pPr marR="58579" lvl="1" algn="just">
+            <a:pPr marL="0" marR="0" lvl="0" indent="0" algn="l" rtl="0">
               <a:lnSpc>
-                <a:spcPct val="150000"/>
+                <a:spcPct val="100000"/>
               </a:lnSpc>
               <a:spcBef>
-                <a:spcPts val="180"/>
-              </a:spcBef>
+                <a:spcPts val="0"/>
+              </a:spcBef>
+              <a:spcAft>
+                <a:spcPts val="0"/>
+              </a:spcAft>
+              <a:buNone/>
             </a:pPr>
             <a:r>
-              <a:rPr lang="es-MX" sz="1050" dirty="0">
+              <a:rPr lang="es-ES" sz="1600" b="1" i="0" u="none" strike="noStrike" cap="none" dirty="0">
+                <a:solidFill>
+                  <a:srgbClr val="000000"/>
+                </a:solidFill>
                 <a:latin typeface="Helvetica Neue Light"/>
-              </a:rPr>
-              <a:t>Implementación de diferentes modelos de NLP.</a:t>
-            </a:r>
-          </a:p>
-          <a:p>
-            <a:pPr marR="58579" lvl="1" algn="just">
+                <a:ea typeface="Helvetica Neue Light"/>
+                <a:cs typeface="Helvetica Neue Light"/>
+                <a:sym typeface="Helvetica Neue Light"/>
+              </a:rPr>
+              <a:t>Resultados de Métricas con BERT</a:t>
+            </a:r>
+            <a:endParaRPr sz="1600" b="1" i="0" u="none" strike="noStrike" cap="none" dirty="0">
+              <a:solidFill>
+                <a:srgbClr val="000000"/>
+              </a:solidFill>
+              <a:latin typeface="Helvetica Neue Light"/>
+              <a:ea typeface="Helvetica Neue Light"/>
+              <a:cs typeface="Helvetica Neue Light"/>
+              <a:sym typeface="Helvetica Neue Light"/>
+            </a:endParaRPr>
+          </a:p>
+        </p:txBody>
+      </p:sp>
+      <p:sp>
+        <p:nvSpPr>
+          <p:cNvPr id="9" name="Rectangle 3">
+            <a:extLst>
+              <a:ext uri="{FF2B5EF4-FFF2-40B4-BE49-F238E27FC236}">
+                <a16:creationId xmlns:a16="http://schemas.microsoft.com/office/drawing/2014/main" id="{A350C2E0-60D7-9A21-6E22-BE056882BF70}"/>
+              </a:ext>
+            </a:extLst>
+          </p:cNvPr>
+          <p:cNvSpPr>
+            <a:spLocks noChangeArrowheads="1"/>
+          </p:cNvSpPr>
+          <p:nvPr/>
+        </p:nvSpPr>
+        <p:spPr bwMode="auto">
+          <a:xfrm>
+            <a:off x="3649856" y="1381083"/>
+            <a:ext cx="1844287" cy="984885"/>
+          </a:xfrm>
+          <a:prstGeom prst="rect">
+            <a:avLst/>
+          </a:prstGeom>
+          <a:solidFill>
+            <a:srgbClr val="FFFFFF"/>
+          </a:solidFill>
+          <a:ln>
+            <a:noFill/>
+          </a:ln>
+          <a:effectLst/>
+          <a:extLst>
+            <a:ext uri="{91240B29-F687-4F45-9708-019B960494DF}">
+              <a14:hiddenLine xmlns:a14="http://schemas.microsoft.com/office/drawing/2010/main" w="9525">
+                <a:solidFill>
+                  <a:schemeClr val="tx1"/>
+                </a:solidFill>
+                <a:miter lim="800000"/>
+                <a:headEnd/>
+                <a:tailEnd/>
+              </a14:hiddenLine>
+            </a:ext>
+            <a:ext uri="{AF507438-7753-43E0-B8FC-AC1667EBCBE1}">
+              <a14:hiddenEffects xmlns:a14="http://schemas.microsoft.com/office/drawing/2010/main">
+                <a:effectLst>
+                  <a:outerShdw dist="35921" dir="2700000" algn="ctr" rotWithShape="0">
+                    <a:schemeClr val="bg2"/>
+                  </a:outerShdw>
+                </a:effectLst>
+              </a14:hiddenEffects>
+            </a:ext>
+          </a:extLst>
+        </p:spPr>
+        <p:txBody>
+          <a:bodyPr vert="horz" wrap="square" lIns="0" tIns="0" rIns="0" bIns="0" numCol="1" anchor="ctr" anchorCtr="0" compatLnSpc="1">
+            <a:prstTxWarp prst="textNoShape">
+              <a:avLst/>
+            </a:prstTxWarp>
+            <a:spAutoFit/>
+          </a:bodyPr>
+          <a:lstStyle/>
+          <a:p>
+            <a:pPr marL="0" marR="0" lvl="0" indent="0" algn="l" defTabSz="914400" rtl="0" eaLnBrk="0" fontAlgn="base" latinLnBrk="0" hangingPunct="0">
               <a:lnSpc>
-                <a:spcPct val="150000"/>
+                <a:spcPct val="100000"/>
               </a:lnSpc>
               <a:spcBef>
-                <a:spcPts val="180"/>
-              </a:spcBef>
+                <a:spcPct val="0"/>
+              </a:spcBef>
+              <a:spcAft>
+                <a:spcPct val="0"/>
+              </a:spcAft>
+              <a:buClrTx/>
+              <a:buSzTx/>
+              <a:buFontTx/>
+              <a:buNone/>
+              <a:tabLst/>
             </a:pPr>
             <a:r>
-              <a:rPr lang="es-MX" sz="1050" dirty="0">
-                <a:latin typeface="Helvetica Neue Light"/>
-              </a:rPr>
-              <a:t>A. </a:t>
-            </a:r>
-            <a:r>
-              <a:rPr lang="es-MX" sz="1050" b="1" dirty="0">
-                <a:latin typeface="Helvetica Neue Light"/>
-              </a:rPr>
-              <a:t>Modelo de Regresión Logística (</a:t>
-            </a:r>
-            <a:r>
-              <a:rPr lang="es-MX" sz="1050" b="1" dirty="0" err="1">
-                <a:latin typeface="Helvetica Neue Light"/>
-              </a:rPr>
-              <a:t>Logistic</a:t>
-            </a:r>
-            <a:r>
-              <a:rPr lang="es-MX" sz="1050" b="1" dirty="0">
-                <a:latin typeface="Helvetica Neue Light"/>
+              <a:rPr kumimoji="0" lang="es-CO" altLang="es-CO" sz="1600" b="1" i="0" u="none" strike="noStrike" cap="none" normalizeH="0" baseline="0" dirty="0" err="1">
+                <a:ln>
+                  <a:noFill/>
+                </a:ln>
+                <a:solidFill>
+                  <a:schemeClr val="tx1"/>
+                </a:solidFill>
+                <a:effectLst/>
+                <a:latin typeface="Arial Unicode MS"/>
+              </a:rPr>
+              <a:t>Accuracy</a:t>
+            </a:r>
+            <a:r>
+              <a:rPr kumimoji="0" lang="es-CO" altLang="es-CO" sz="1600" b="0" i="0" u="none" strike="noStrike" cap="none" normalizeH="0" baseline="0" dirty="0">
+                <a:ln>
+                  <a:noFill/>
+                </a:ln>
+                <a:solidFill>
+                  <a:schemeClr val="tx1"/>
+                </a:solidFill>
+                <a:effectLst/>
+                <a:latin typeface="Arial Unicode MS"/>
+              </a:rPr>
+              <a:t>: 0.9500 </a:t>
+            </a:r>
+          </a:p>
+          <a:p>
+            <a:pPr marL="0" marR="0" lvl="0" indent="0" algn="l" defTabSz="914400" rtl="0" eaLnBrk="0" fontAlgn="base" latinLnBrk="0" hangingPunct="0">
+              <a:lnSpc>
+                <a:spcPct val="100000"/>
+              </a:lnSpc>
+              <a:spcBef>
+                <a:spcPct val="0"/>
+              </a:spcBef>
+              <a:spcAft>
+                <a:spcPct val="0"/>
+              </a:spcAft>
+              <a:buClrTx/>
+              <a:buSzTx/>
+              <a:buFontTx/>
+              <a:buNone/>
+              <a:tabLst/>
+            </a:pPr>
+            <a:r>
+              <a:rPr kumimoji="0" lang="es-CO" altLang="es-CO" sz="1600" b="1" i="0" u="none" strike="noStrike" cap="none" normalizeH="0" baseline="0" dirty="0" err="1">
+                <a:ln>
+                  <a:noFill/>
+                </a:ln>
+                <a:solidFill>
+                  <a:schemeClr val="tx1"/>
+                </a:solidFill>
+                <a:effectLst/>
+                <a:latin typeface="Arial Unicode MS"/>
+              </a:rPr>
+              <a:t>Precision</a:t>
+            </a:r>
+            <a:r>
+              <a:rPr kumimoji="0" lang="es-CO" altLang="es-CO" sz="1600" b="0" i="0" u="none" strike="noStrike" cap="none" normalizeH="0" baseline="0" dirty="0">
+                <a:ln>
+                  <a:noFill/>
+                </a:ln>
+                <a:solidFill>
+                  <a:schemeClr val="tx1"/>
+                </a:solidFill>
+                <a:effectLst/>
+                <a:latin typeface="Arial Unicode MS"/>
+              </a:rPr>
+              <a:t>: 0.9412 </a:t>
+            </a:r>
+          </a:p>
+          <a:p>
+            <a:pPr marL="0" marR="0" lvl="0" indent="0" algn="l" defTabSz="914400" rtl="0" eaLnBrk="0" fontAlgn="base" latinLnBrk="0" hangingPunct="0">
+              <a:lnSpc>
+                <a:spcPct val="100000"/>
+              </a:lnSpc>
+              <a:spcBef>
+                <a:spcPct val="0"/>
+              </a:spcBef>
+              <a:spcAft>
+                <a:spcPct val="0"/>
+              </a:spcAft>
+              <a:buClrTx/>
+              <a:buSzTx/>
+              <a:buFontTx/>
+              <a:buNone/>
+              <a:tabLst/>
+            </a:pPr>
+            <a:r>
+              <a:rPr kumimoji="0" lang="es-CO" altLang="es-CO" sz="1600" b="1" i="0" u="none" strike="noStrike" cap="none" normalizeH="0" baseline="0" dirty="0" err="1">
+                <a:ln>
+                  <a:noFill/>
+                </a:ln>
+                <a:solidFill>
+                  <a:schemeClr val="tx1"/>
+                </a:solidFill>
+                <a:effectLst/>
+                <a:latin typeface="Arial Unicode MS"/>
+              </a:rPr>
+              <a:t>Recall</a:t>
+            </a:r>
+            <a:r>
+              <a:rPr kumimoji="0" lang="es-CO" altLang="es-CO" sz="1600" b="0" i="0" u="none" strike="noStrike" cap="none" normalizeH="0" baseline="0" dirty="0">
+                <a:ln>
+                  <a:noFill/>
+                </a:ln>
+                <a:solidFill>
+                  <a:schemeClr val="tx1"/>
+                </a:solidFill>
+                <a:effectLst/>
+                <a:latin typeface="Arial Unicode MS"/>
+              </a:rPr>
+              <a:t>: 	  1.0000 </a:t>
+            </a:r>
+          </a:p>
+          <a:p>
+            <a:pPr marL="0" marR="0" lvl="0" indent="0" defTabSz="914400" rtl="0" eaLnBrk="0" fontAlgn="base" latinLnBrk="0" hangingPunct="0">
+              <a:lnSpc>
+                <a:spcPct val="100000"/>
+              </a:lnSpc>
+              <a:spcBef>
+                <a:spcPct val="0"/>
+              </a:spcBef>
+              <a:spcAft>
+                <a:spcPct val="0"/>
+              </a:spcAft>
+              <a:buClrTx/>
+              <a:buSzTx/>
+              <a:buFontTx/>
+              <a:buNone/>
+              <a:tabLst/>
+            </a:pPr>
+            <a:r>
+              <a:rPr kumimoji="0" lang="es-CO" altLang="es-CO" sz="1600" b="1" i="0" u="none" strike="noStrike" cap="none" normalizeH="0" baseline="0" dirty="0">
+                <a:ln>
+                  <a:noFill/>
+                </a:ln>
+                <a:solidFill>
+                  <a:schemeClr val="tx1"/>
+                </a:solidFill>
+                <a:effectLst/>
+                <a:latin typeface="Arial Unicode MS"/>
+              </a:rPr>
+              <a:t>F1-Score</a:t>
+            </a:r>
+            <a:r>
+              <a:rPr kumimoji="0" lang="es-CO" altLang="es-CO" sz="1600" b="0" i="0" u="none" strike="noStrike" cap="none" normalizeH="0" baseline="0" dirty="0">
+                <a:ln>
+                  <a:noFill/>
+                </a:ln>
+                <a:solidFill>
+                  <a:schemeClr val="tx1"/>
+                </a:solidFill>
+                <a:effectLst/>
+                <a:latin typeface="Arial Unicode MS"/>
+              </a:rPr>
+              <a:t>: </a:t>
+            </a:r>
+            <a:r>
+              <a:rPr lang="es-CO" altLang="es-CO" sz="1600" dirty="0">
+                <a:solidFill>
+                  <a:schemeClr val="tx1"/>
+                </a:solidFill>
+                <a:latin typeface="Arial Unicode MS"/>
               </a:rPr>
               <a:t> </a:t>
             </a:r>
             <a:r>
-              <a:rPr lang="es-MX" sz="1050" b="1" dirty="0" err="1">
-                <a:latin typeface="Helvetica Neue Light"/>
-              </a:rPr>
-              <a:t>Regression</a:t>
-            </a:r>
-            <a:r>
-              <a:rPr lang="es-MX" sz="1050" b="1" dirty="0">
-                <a:latin typeface="Helvetica Neue Light"/>
-              </a:rPr>
-              <a:t>)</a:t>
-            </a:r>
-            <a:r>
-              <a:rPr lang="es-MX" sz="1050" dirty="0">
-                <a:latin typeface="Helvetica Neue Light"/>
-              </a:rPr>
-              <a:t> El modelo de Regresión Logística se utiliza para la clasificación binaria. Calcula la probabilidad de que una observación pertenezca a una clase utilizando una función logística.</a:t>
-            </a:r>
-          </a:p>
-          <a:p>
-            <a:pPr marR="58579" lvl="1" algn="just">
+              <a:rPr kumimoji="0" lang="es-CO" altLang="es-CO" sz="1600" b="0" i="0" u="none" strike="noStrike" cap="none" normalizeH="0" baseline="0" dirty="0">
+                <a:ln>
+                  <a:noFill/>
+                </a:ln>
+                <a:solidFill>
+                  <a:schemeClr val="tx1"/>
+                </a:solidFill>
+                <a:effectLst/>
+                <a:latin typeface="Arial Unicode MS"/>
+              </a:rPr>
+              <a:t>0.9697</a:t>
+            </a:r>
+            <a:r>
+              <a:rPr kumimoji="0" lang="es-CO" altLang="es-CO" sz="1100" b="0" i="0" u="none" strike="noStrike" cap="none" normalizeH="0" baseline="0" dirty="0">
+                <a:ln>
+                  <a:noFill/>
+                </a:ln>
+                <a:solidFill>
+                  <a:schemeClr val="tx1"/>
+                </a:solidFill>
+                <a:effectLst/>
+              </a:rPr>
+              <a:t> </a:t>
+            </a:r>
+            <a:endParaRPr kumimoji="0" lang="es-CO" altLang="es-CO" sz="4000" b="0" i="0" u="none" strike="noStrike" cap="none" normalizeH="0" baseline="0" dirty="0">
+              <a:ln>
+                <a:noFill/>
+              </a:ln>
+              <a:solidFill>
+                <a:schemeClr val="tx1"/>
+              </a:solidFill>
+              <a:effectLst/>
+              <a:latin typeface="Arial" panose="020B0604020202020204" pitchFamily="34" charset="0"/>
+            </a:endParaRPr>
+          </a:p>
+        </p:txBody>
+      </p:sp>
+      <p:sp>
+        <p:nvSpPr>
+          <p:cNvPr id="10" name="Rectangle 4">
+            <a:extLst>
+              <a:ext uri="{FF2B5EF4-FFF2-40B4-BE49-F238E27FC236}">
+                <a16:creationId xmlns:a16="http://schemas.microsoft.com/office/drawing/2014/main" id="{86F9153F-ADDC-2892-108C-08C40F125730}"/>
+              </a:ext>
+            </a:extLst>
+          </p:cNvPr>
+          <p:cNvSpPr>
+            <a:spLocks noChangeArrowheads="1"/>
+          </p:cNvSpPr>
+          <p:nvPr/>
+        </p:nvSpPr>
+        <p:spPr bwMode="auto">
+          <a:xfrm>
+            <a:off x="3649856" y="2713004"/>
+            <a:ext cx="1732635" cy="738664"/>
+          </a:xfrm>
+          <a:prstGeom prst="rect">
+            <a:avLst/>
+          </a:prstGeom>
+          <a:solidFill>
+            <a:srgbClr val="FFFFFF"/>
+          </a:solidFill>
+          <a:ln>
+            <a:noFill/>
+          </a:ln>
+          <a:effectLst/>
+          <a:extLst>
+            <a:ext uri="{91240B29-F687-4F45-9708-019B960494DF}">
+              <a14:hiddenLine xmlns:a14="http://schemas.microsoft.com/office/drawing/2010/main" w="9525">
+                <a:solidFill>
+                  <a:schemeClr val="tx1"/>
+                </a:solidFill>
+                <a:miter lim="800000"/>
+                <a:headEnd/>
+                <a:tailEnd/>
+              </a14:hiddenLine>
+            </a:ext>
+            <a:ext uri="{AF507438-7753-43E0-B8FC-AC1667EBCBE1}">
+              <a14:hiddenEffects xmlns:a14="http://schemas.microsoft.com/office/drawing/2010/main">
+                <a:effectLst>
+                  <a:outerShdw dist="35921" dir="2700000" algn="ctr" rotWithShape="0">
+                    <a:schemeClr val="bg2"/>
+                  </a:outerShdw>
+                </a:effectLst>
+              </a14:hiddenEffects>
+            </a:ext>
+          </a:extLst>
+        </p:spPr>
+        <p:txBody>
+          <a:bodyPr vert="horz" wrap="square" lIns="0" tIns="0" rIns="0" bIns="0" numCol="1" anchor="ctr" anchorCtr="0" compatLnSpc="1">
+            <a:prstTxWarp prst="textNoShape">
+              <a:avLst/>
+            </a:prstTxWarp>
+            <a:spAutoFit/>
+          </a:bodyPr>
+          <a:lstStyle/>
+          <a:p>
+            <a:pPr marL="0" marR="0" lvl="0" indent="0" algn="l" defTabSz="914400" rtl="0" eaLnBrk="0" fontAlgn="base" latinLnBrk="0" hangingPunct="0">
               <a:lnSpc>
-                <a:spcPct val="150000"/>
+                <a:spcPct val="100000"/>
               </a:lnSpc>
               <a:spcBef>
-                <a:spcPts val="180"/>
-              </a:spcBef>
+                <a:spcPct val="0"/>
+              </a:spcBef>
+              <a:spcAft>
+                <a:spcPct val="0"/>
+              </a:spcAft>
+              <a:buClrTx/>
+              <a:buSzTx/>
+              <a:buFontTx/>
+              <a:buNone/>
+              <a:tabLst/>
             </a:pPr>
             <a:r>
-              <a:rPr lang="es-MX" sz="1050" dirty="0">
-                <a:latin typeface="Helvetica Neue Light"/>
-              </a:rPr>
-              <a:t>B. </a:t>
-            </a:r>
-            <a:r>
-              <a:rPr lang="es-MX" sz="1050" b="1" dirty="0">
-                <a:latin typeface="Helvetica Neue Light"/>
-              </a:rPr>
-              <a:t>Modelo de Clasificación </a:t>
-            </a:r>
-            <a:r>
-              <a:rPr lang="es-MX" sz="1050" b="1" dirty="0" err="1">
-                <a:latin typeface="Helvetica Neue Light"/>
-              </a:rPr>
-              <a:t>Gradient</a:t>
-            </a:r>
-            <a:r>
-              <a:rPr lang="es-MX" sz="1050" b="1" dirty="0">
-                <a:latin typeface="Helvetica Neue Light"/>
+              <a:rPr kumimoji="0" lang="es-CO" altLang="es-CO" sz="1600" b="1" i="0" u="none" strike="noStrike" cap="none" normalizeH="0" baseline="0" dirty="0" err="1">
+                <a:ln>
+                  <a:noFill/>
+                </a:ln>
+                <a:solidFill>
+                  <a:schemeClr val="tx1"/>
+                </a:solidFill>
+                <a:effectLst/>
+                <a:latin typeface="Arial Unicode MS"/>
+              </a:rPr>
+              <a:t>Confusion</a:t>
+            </a:r>
+            <a:r>
+              <a:rPr kumimoji="0" lang="es-CO" altLang="es-CO" sz="1600" b="1" i="0" u="none" strike="noStrike" cap="none" normalizeH="0" baseline="0" dirty="0">
+                <a:ln>
+                  <a:noFill/>
+                </a:ln>
+                <a:solidFill>
+                  <a:schemeClr val="tx1"/>
+                </a:solidFill>
+                <a:effectLst/>
+                <a:latin typeface="Arial Unicode MS"/>
+              </a:rPr>
+              <a:t> Matrix: </a:t>
+            </a:r>
+          </a:p>
+          <a:p>
+            <a:pPr marL="0" marR="0" lvl="0" indent="0" algn="ctr" defTabSz="914400" rtl="0" eaLnBrk="0" fontAlgn="base" latinLnBrk="0" hangingPunct="0">
+              <a:lnSpc>
+                <a:spcPct val="100000"/>
+              </a:lnSpc>
+              <a:spcBef>
+                <a:spcPct val="0"/>
+              </a:spcBef>
+              <a:spcAft>
+                <a:spcPct val="0"/>
+              </a:spcAft>
+              <a:buClrTx/>
+              <a:buSzTx/>
+              <a:buFontTx/>
+              <a:buNone/>
+              <a:tabLst/>
+            </a:pPr>
+            <a:r>
+              <a:rPr kumimoji="0" lang="es-CO" altLang="es-CO" sz="1600" b="0" i="0" u="none" strike="noStrike" cap="none" normalizeH="0" baseline="0" dirty="0">
+                <a:ln>
+                  <a:noFill/>
+                </a:ln>
+                <a:solidFill>
+                  <a:schemeClr val="tx1"/>
+                </a:solidFill>
+                <a:effectLst/>
+                <a:latin typeface="Arial Unicode MS"/>
+              </a:rPr>
+              <a:t>[[12 4] </a:t>
+            </a:r>
+          </a:p>
+          <a:p>
+            <a:pPr marL="0" marR="0" lvl="0" indent="0" algn="ctr" defTabSz="914400" rtl="0" eaLnBrk="0" fontAlgn="base" latinLnBrk="0" hangingPunct="0">
+              <a:lnSpc>
+                <a:spcPct val="100000"/>
+              </a:lnSpc>
+              <a:spcBef>
+                <a:spcPct val="0"/>
+              </a:spcBef>
+              <a:spcAft>
+                <a:spcPct val="0"/>
+              </a:spcAft>
+              <a:buClrTx/>
+              <a:buSzTx/>
+              <a:buFontTx/>
+              <a:buNone/>
+              <a:tabLst/>
+            </a:pPr>
+            <a:r>
+              <a:rPr kumimoji="0" lang="es-CO" altLang="es-CO" sz="1600" b="0" i="0" u="none" strike="noStrike" cap="none" normalizeH="0" baseline="0" dirty="0">
+                <a:ln>
+                  <a:noFill/>
+                </a:ln>
+                <a:solidFill>
+                  <a:schemeClr val="tx1"/>
+                </a:solidFill>
+                <a:effectLst/>
+                <a:latin typeface="Arial Unicode MS"/>
+              </a:rPr>
+              <a:t>[ 0 64]]</a:t>
+            </a:r>
+            <a:r>
+              <a:rPr kumimoji="0" lang="es-CO" altLang="es-CO" sz="1100" b="0" i="0" u="none" strike="noStrike" cap="none" normalizeH="0" baseline="0" dirty="0">
+                <a:ln>
+                  <a:noFill/>
+                </a:ln>
+                <a:solidFill>
+                  <a:schemeClr val="tx1"/>
+                </a:solidFill>
+                <a:effectLst/>
               </a:rPr>
               <a:t> </a:t>
             </a:r>
-            <a:r>
-              <a:rPr lang="es-MX" sz="1050" b="1" dirty="0" err="1">
-                <a:latin typeface="Helvetica Neue Light"/>
-              </a:rPr>
-              <a:t>Boosting</a:t>
-            </a:r>
-            <a:r>
-              <a:rPr lang="es-MX" sz="1050" b="1" dirty="0">
-                <a:latin typeface="Helvetica Neue Light"/>
-              </a:rPr>
-              <a:t> </a:t>
-            </a:r>
-            <a:r>
-              <a:rPr lang="es-MX" sz="1050" dirty="0">
-                <a:latin typeface="Helvetica Neue Light"/>
-              </a:rPr>
-              <a:t>El modelo de Clasificación </a:t>
-            </a:r>
-            <a:r>
-              <a:rPr lang="es-MX" sz="1050" dirty="0" err="1">
-                <a:latin typeface="Helvetica Neue Light"/>
-              </a:rPr>
-              <a:t>Gradient</a:t>
-            </a:r>
-            <a:r>
-              <a:rPr lang="es-MX" sz="1050" dirty="0">
-                <a:latin typeface="Helvetica Neue Light"/>
-              </a:rPr>
-              <a:t> </a:t>
-            </a:r>
-            <a:r>
-              <a:rPr lang="es-MX" sz="1050" dirty="0" err="1">
-                <a:latin typeface="Helvetica Neue Light"/>
-              </a:rPr>
-              <a:t>Boosting</a:t>
-            </a:r>
-            <a:r>
-              <a:rPr lang="es-MX" sz="1050" dirty="0">
-                <a:latin typeface="Helvetica Neue Light"/>
-              </a:rPr>
-              <a:t> es un algoritmo de conjunto que combina múltiples árboles de decisión más débiles para construir un modelo predictivo más fuerte.</a:t>
-            </a:r>
-          </a:p>
-          <a:p>
-            <a:pPr marR="58579" lvl="1" algn="just">
-              <a:lnSpc>
-                <a:spcPct val="150000"/>
-              </a:lnSpc>
-              <a:spcBef>
-                <a:spcPts val="180"/>
-              </a:spcBef>
-            </a:pPr>
-            <a:r>
-              <a:rPr lang="es-MX" sz="1050" dirty="0">
-                <a:latin typeface="Helvetica Neue Light"/>
-              </a:rPr>
-              <a:t>C. </a:t>
-            </a:r>
-            <a:r>
-              <a:rPr lang="es-MX" sz="1050" b="1" dirty="0">
-                <a:latin typeface="Helvetica Neue Light"/>
-              </a:rPr>
-              <a:t>Modelo de Deep </a:t>
-            </a:r>
-            <a:r>
-              <a:rPr lang="es-MX" sz="1050" b="1" dirty="0" err="1">
-                <a:latin typeface="Helvetica Neue Light"/>
-              </a:rPr>
-              <a:t>Learning</a:t>
-            </a:r>
-            <a:r>
-              <a:rPr lang="es-MX" sz="1050" b="1" dirty="0">
-                <a:latin typeface="Helvetica Neue Light"/>
-              </a:rPr>
-              <a:t> RNN </a:t>
-            </a:r>
-            <a:r>
-              <a:rPr lang="es-MX" sz="1050" dirty="0">
-                <a:latin typeface="Helvetica Neue Light"/>
-              </a:rPr>
-              <a:t>El modelo utiliza una red neuronal recurrente LSTM para procesar secuencias de texto, seguido de una capa densa de salida con activación sigmoide para clasificación binaria, y se compila con la función de pérdida de entropía cruzada binaria y el optimizador Adam.</a:t>
-            </a:r>
-          </a:p>
-          <a:p>
-            <a:pPr marR="58579" lvl="1" algn="just">
-              <a:lnSpc>
-                <a:spcPct val="150000"/>
-              </a:lnSpc>
-              <a:spcBef>
-                <a:spcPts val="180"/>
-              </a:spcBef>
-            </a:pPr>
-            <a:r>
-              <a:rPr lang="es-MX" sz="1050" dirty="0">
-                <a:latin typeface="Helvetica Neue Light"/>
-              </a:rPr>
-              <a:t>D. </a:t>
-            </a:r>
-            <a:r>
-              <a:rPr lang="es-MX" sz="1050" b="1" dirty="0">
-                <a:latin typeface="Helvetica Neue Light"/>
-              </a:rPr>
-              <a:t>Modelo de Regresión Logística TF-IDF: </a:t>
-            </a:r>
-            <a:r>
-              <a:rPr lang="es-MX" sz="1050" dirty="0">
-                <a:latin typeface="Helvetica Neue Light"/>
-              </a:rPr>
-              <a:t>En este caso, implementaremos la técnica de TF-IDF (</a:t>
-            </a:r>
-            <a:r>
-              <a:rPr lang="es-MX" sz="1050" dirty="0" err="1">
-                <a:latin typeface="Helvetica Neue Light"/>
-              </a:rPr>
-              <a:t>Term</a:t>
-            </a:r>
-            <a:r>
-              <a:rPr lang="es-MX" sz="1050" dirty="0">
-                <a:latin typeface="Helvetica Neue Light"/>
-              </a:rPr>
-              <a:t> </a:t>
-            </a:r>
-            <a:r>
-              <a:rPr lang="es-MX" sz="1050" dirty="0" err="1">
-                <a:latin typeface="Helvetica Neue Light"/>
-              </a:rPr>
-              <a:t>Frequency</a:t>
-            </a:r>
-            <a:r>
-              <a:rPr lang="es-MX" sz="1050" dirty="0">
-                <a:latin typeface="Helvetica Neue Light"/>
-              </a:rPr>
-              <a:t>-Inverse </a:t>
-            </a:r>
-            <a:r>
-              <a:rPr lang="es-MX" sz="1050" dirty="0" err="1">
-                <a:latin typeface="Helvetica Neue Light"/>
-              </a:rPr>
-              <a:t>Document</a:t>
-            </a:r>
-            <a:r>
-              <a:rPr lang="es-MX" sz="1050" dirty="0">
-                <a:latin typeface="Helvetica Neue Light"/>
-              </a:rPr>
-              <a:t> </a:t>
-            </a:r>
-            <a:r>
-              <a:rPr lang="es-MX" sz="1050" dirty="0" err="1">
-                <a:latin typeface="Helvetica Neue Light"/>
-              </a:rPr>
-              <a:t>Frequency</a:t>
-            </a:r>
-            <a:r>
-              <a:rPr lang="es-MX" sz="1050" dirty="0">
-                <a:latin typeface="Helvetica Neue Light"/>
-              </a:rPr>
-              <a:t>) en el modelo de regresión logística. TF-IDF asigna pesos a palabras según su frecuencia en un documento y su rareza en el conjunto de documentos, destacando términos importantes en el análisis de texto.</a:t>
-            </a:r>
-          </a:p>
-          <a:p>
-            <a:pPr marR="58579" lvl="1" algn="just">
-              <a:lnSpc>
-                <a:spcPct val="150000"/>
-              </a:lnSpc>
-              <a:spcBef>
-                <a:spcPts val="180"/>
-              </a:spcBef>
-            </a:pPr>
-            <a:r>
-              <a:rPr lang="es-MX" sz="1050" dirty="0">
-                <a:latin typeface="Helvetica Neue Light"/>
-              </a:rPr>
-              <a:t>E. </a:t>
-            </a:r>
-            <a:r>
-              <a:rPr lang="es-MX" sz="1050" b="1" dirty="0">
-                <a:latin typeface="Helvetica Neue Light"/>
-              </a:rPr>
-              <a:t>Modelo Basado en BERT </a:t>
-            </a:r>
-            <a:r>
-              <a:rPr lang="es-MX" sz="1050" dirty="0" err="1">
-                <a:latin typeface="Helvetica Neue Light"/>
-              </a:rPr>
-              <a:t>Bidirectional</a:t>
-            </a:r>
-            <a:r>
-              <a:rPr lang="es-MX" sz="1050" dirty="0">
-                <a:latin typeface="Helvetica Neue Light"/>
-              </a:rPr>
-              <a:t> </a:t>
-            </a:r>
-            <a:r>
-              <a:rPr lang="es-MX" sz="1050" dirty="0" err="1">
-                <a:latin typeface="Helvetica Neue Light"/>
-              </a:rPr>
-              <a:t>Encoder</a:t>
-            </a:r>
-            <a:r>
-              <a:rPr lang="es-MX" sz="1050" dirty="0">
-                <a:latin typeface="Helvetica Neue Light"/>
-              </a:rPr>
-              <a:t> </a:t>
-            </a:r>
-            <a:r>
-              <a:rPr lang="es-MX" sz="1050" dirty="0" err="1">
-                <a:latin typeface="Helvetica Neue Light"/>
-              </a:rPr>
-              <a:t>Representations</a:t>
-            </a:r>
-            <a:r>
-              <a:rPr lang="es-MX" sz="1050" dirty="0">
-                <a:latin typeface="Helvetica Neue Light"/>
-              </a:rPr>
-              <a:t> </a:t>
-            </a:r>
-            <a:r>
-              <a:rPr lang="es-MX" sz="1050" dirty="0" err="1">
-                <a:latin typeface="Helvetica Neue Light"/>
-              </a:rPr>
-              <a:t>from</a:t>
-            </a:r>
-            <a:r>
-              <a:rPr lang="es-MX" sz="1050" dirty="0">
-                <a:latin typeface="Helvetica Neue Light"/>
-              </a:rPr>
-              <a:t> Transformers (BERT) es un modelo de lenguaje basado en transformadores que </a:t>
-            </a:r>
-            <a:r>
-              <a:rPr lang="es-MX" sz="1050" dirty="0" err="1">
-                <a:latin typeface="Helvetica Neue Light"/>
-              </a:rPr>
-              <a:t>preentrena</a:t>
-            </a:r>
-            <a:r>
-              <a:rPr lang="es-MX" sz="1050" dirty="0">
-                <a:latin typeface="Helvetica Neue Light"/>
-              </a:rPr>
-              <a:t> representaciones de texto bidireccionales para comprender mejor el contexto de las palabras en una oración. Este modelo es especialmente interesante para nosotros, dado el alto nivel técnico de las sentencias de la corte, ya que su tipo de análisis podría generar una representación más fiable del caso de estudio.</a:t>
-            </a:r>
-            <a:endParaRPr lang="es-MX" sz="1050" dirty="0">
+            <a:endParaRPr kumimoji="0" lang="es-CO" altLang="es-CO" sz="4000" b="0" i="0" u="none" strike="noStrike" cap="none" normalizeH="0" baseline="0" dirty="0">
+              <a:ln>
+                <a:noFill/>
+              </a:ln>
               <a:solidFill>
-                <a:srgbClr val="0D0D0D"/>
+                <a:schemeClr val="tx1"/>
               </a:solidFill>
-              <a:highlight>
-                <a:srgbClr val="FFFFFF"/>
-              </a:highlight>
-              <a:latin typeface="ui-sans-serif"/>
+              <a:effectLst/>
+              <a:latin typeface="Arial" panose="020B0604020202020204" pitchFamily="34" charset="0"/>
             </a:endParaRPr>
           </a:p>
         </p:txBody>
@@ -10466,7 +10870,7 @@
     </p:spTree>
     <p:extLst>
       <p:ext uri="{BB962C8B-B14F-4D97-AF65-F5344CB8AC3E}">
-        <p14:creationId xmlns:p14="http://schemas.microsoft.com/office/powerpoint/2010/main" val="1686361473"/>
+        <p14:creationId xmlns:p14="http://schemas.microsoft.com/office/powerpoint/2010/main" val="1822766431"/>
       </p:ext>
     </p:extLst>
   </p:cSld>
@@ -10495,14 +10899,14 @@
       </p:grpSpPr>
       <p:sp>
         <p:nvSpPr>
-          <p:cNvPr id="26" name="Google Shape;26;p6"/>
+          <p:cNvPr id="27" name="Google Shape;27;p6"/>
           <p:cNvSpPr txBox="1"/>
           <p:nvPr/>
         </p:nvSpPr>
         <p:spPr>
           <a:xfrm>
-            <a:off x="662940" y="1519444"/>
-            <a:ext cx="8016240" cy="1638900"/>
+            <a:off x="670313" y="407229"/>
+            <a:ext cx="4572000" cy="338554"/>
           </a:xfrm>
           <a:prstGeom prst="rect">
             <a:avLst/>
@@ -10513,66 +10917,6 @@
           </a:ln>
         </p:spPr>
         <p:txBody>
-          <a:bodyPr spcFirstLastPara="1" wrap="square" lIns="0" tIns="22850" rIns="0" bIns="0" anchor="t" anchorCtr="0">
-            <a:spAutoFit/>
-          </a:bodyPr>
-          <a:lstStyle/>
-          <a:p>
-            <a:pPr marL="9525" marR="58579" lvl="0" indent="0" algn="just" rtl="0">
-              <a:lnSpc>
-                <a:spcPct val="150000"/>
-              </a:lnSpc>
-              <a:spcBef>
-                <a:spcPts val="0"/>
-              </a:spcBef>
-              <a:spcAft>
-                <a:spcPts val="0"/>
-              </a:spcAft>
-              <a:buNone/>
-            </a:pPr>
-            <a:r>
-              <a:rPr lang="es-MX" dirty="0"/>
-              <a:t>Conjunto al modelo BERT que usamos para clasificación de secuencias en un conjunto de datos judiciales, pudimos hacer el montaje de un modelo de </a:t>
-            </a:r>
-            <a:r>
-              <a:rPr lang="es-MX" dirty="0" err="1"/>
-              <a:t>Question</a:t>
-            </a:r>
-            <a:r>
-              <a:rPr lang="es-MX" dirty="0"/>
-              <a:t> &amp; </a:t>
-            </a:r>
-            <a:r>
-              <a:rPr lang="es-MX" dirty="0" err="1"/>
-              <a:t>Answering</a:t>
-            </a:r>
-            <a:r>
-              <a:rPr lang="es-MX" dirty="0"/>
-              <a:t> (Q&amp;A) para responder preguntas específicas relacionadas con las opiniones consultivas de la Corte Internacional de Justicia (CIJ). Los resultados fueron satisfactorios para todos nosotros puesto que cumplimos con nuestro objetivo principal</a:t>
-            </a:r>
-          </a:p>
-        </p:txBody>
-      </p:sp>
-      <p:sp>
-        <p:nvSpPr>
-          <p:cNvPr id="27" name="Google Shape;27;p6"/>
-          <p:cNvSpPr txBox="1"/>
-          <p:nvPr/>
-        </p:nvSpPr>
-        <p:spPr>
-          <a:xfrm>
-            <a:off x="662940" y="585145"/>
-            <a:ext cx="4572000" cy="338554"/>
-          </a:xfrm>
-          <a:prstGeom prst="rect">
-            <a:avLst/>
-          </a:prstGeom>
-          <a:noFill/>
-          <a:ln>
-            <a:noFill/>
-          </a:ln>
-        </p:spPr>
-        <p:txBody>
           <a:bodyPr spcFirstLastPara="1" wrap="square" lIns="91425" tIns="45700" rIns="91425" bIns="45700" anchor="t" anchorCtr="0">
             <a:spAutoFit/>
           </a:bodyPr>
@@ -10600,7 +10944,7 @@
                 <a:cs typeface="Helvetica Neue Light"/>
                 <a:sym typeface="Helvetica Neue Light"/>
               </a:rPr>
-              <a:t>Informe</a:t>
+              <a:t>Modelado</a:t>
             </a:r>
             <a:endParaRPr sz="1600" b="1" i="0" u="none" strike="noStrike" cap="none" dirty="0">
               <a:solidFill>
@@ -10614,10 +10958,137 @@
           </a:p>
         </p:txBody>
       </p:sp>
+      <p:sp>
+        <p:nvSpPr>
+          <p:cNvPr id="3" name="Google Shape;27;p6">
+            <a:extLst>
+              <a:ext uri="{FF2B5EF4-FFF2-40B4-BE49-F238E27FC236}">
+                <a16:creationId xmlns:a16="http://schemas.microsoft.com/office/drawing/2014/main" id="{BFC825DE-4693-FC17-AEA7-CA6D9453F4DE}"/>
+              </a:ext>
+            </a:extLst>
+          </p:cNvPr>
+          <p:cNvSpPr txBox="1"/>
+          <p:nvPr/>
+        </p:nvSpPr>
+        <p:spPr>
+          <a:xfrm>
+            <a:off x="2602513" y="864790"/>
+            <a:ext cx="3938971" cy="338514"/>
+          </a:xfrm>
+          <a:prstGeom prst="rect">
+            <a:avLst/>
+          </a:prstGeom>
+          <a:noFill/>
+          <a:ln>
+            <a:noFill/>
+          </a:ln>
+        </p:spPr>
+        <p:txBody>
+          <a:bodyPr spcFirstLastPara="1" wrap="square" lIns="91425" tIns="45700" rIns="91425" bIns="45700" anchor="t" anchorCtr="0">
+            <a:spAutoFit/>
+          </a:bodyPr>
+          <a:lstStyle/>
+          <a:p>
+            <a:pPr marL="0" marR="0" lvl="0" indent="0" algn="l" rtl="0">
+              <a:lnSpc>
+                <a:spcPct val="100000"/>
+              </a:lnSpc>
+              <a:spcBef>
+                <a:spcPts val="0"/>
+              </a:spcBef>
+              <a:spcAft>
+                <a:spcPts val="0"/>
+              </a:spcAft>
+              <a:buNone/>
+            </a:pPr>
+            <a:r>
+              <a:rPr lang="es-ES" sz="1600" b="1" i="0" u="none" strike="noStrike" cap="none" dirty="0">
+                <a:solidFill>
+                  <a:srgbClr val="000000"/>
+                </a:solidFill>
+                <a:latin typeface="Helvetica Neue Light"/>
+                <a:ea typeface="Helvetica Neue Light"/>
+                <a:cs typeface="Helvetica Neue Light"/>
+                <a:sym typeface="Helvetica Neue Light"/>
+              </a:rPr>
+              <a:t>Predicciones de preguntas con BERT</a:t>
+            </a:r>
+            <a:endParaRPr sz="1600" b="1" i="0" u="none" strike="noStrike" cap="none" dirty="0">
+              <a:solidFill>
+                <a:srgbClr val="000000"/>
+              </a:solidFill>
+              <a:latin typeface="Helvetica Neue Light"/>
+              <a:ea typeface="Helvetica Neue Light"/>
+              <a:cs typeface="Helvetica Neue Light"/>
+              <a:sym typeface="Helvetica Neue Light"/>
+            </a:endParaRPr>
+          </a:p>
+        </p:txBody>
+      </p:sp>
+      <p:pic>
+        <p:nvPicPr>
+          <p:cNvPr id="4" name="Imagen 3">
+            <a:extLst>
+              <a:ext uri="{FF2B5EF4-FFF2-40B4-BE49-F238E27FC236}">
+                <a16:creationId xmlns:a16="http://schemas.microsoft.com/office/drawing/2014/main" id="{D221167B-923E-69CA-A77B-A45766554EC0}"/>
+              </a:ext>
+            </a:extLst>
+          </p:cNvPr>
+          <p:cNvPicPr>
+            <a:picLocks noChangeAspect="1"/>
+          </p:cNvPicPr>
+          <p:nvPr/>
+        </p:nvPicPr>
+        <p:blipFill>
+          <a:blip r:embed="rId3"/>
+          <a:stretch>
+            <a:fillRect/>
+          </a:stretch>
+        </p:blipFill>
+        <p:spPr>
+          <a:xfrm>
+            <a:off x="2152310" y="1725742"/>
+            <a:ext cx="4839375" cy="209579"/>
+          </a:xfrm>
+          <a:prstGeom prst="rect">
+            <a:avLst/>
+          </a:prstGeom>
+        </p:spPr>
+      </p:pic>
+      <p:pic>
+        <p:nvPicPr>
+          <p:cNvPr id="6" name="Imagen 5">
+            <a:extLst>
+              <a:ext uri="{FF2B5EF4-FFF2-40B4-BE49-F238E27FC236}">
+                <a16:creationId xmlns:a16="http://schemas.microsoft.com/office/drawing/2014/main" id="{5A7680BB-8B54-530F-9409-346B868E25D4}"/>
+              </a:ext>
+            </a:extLst>
+          </p:cNvPr>
+          <p:cNvPicPr>
+            <a:picLocks noChangeAspect="1"/>
+          </p:cNvPicPr>
+          <p:nvPr/>
+        </p:nvPicPr>
+        <p:blipFill>
+          <a:blip r:embed="rId4"/>
+          <a:stretch>
+            <a:fillRect/>
+          </a:stretch>
+        </p:blipFill>
+        <p:spPr>
+          <a:xfrm>
+            <a:off x="2142783" y="2264636"/>
+            <a:ext cx="4858428" cy="181000"/>
+          </a:xfrm>
+          <a:prstGeom prst="rect">
+            <a:avLst/>
+          </a:prstGeom>
+        </p:spPr>
+      </p:pic>
     </p:spTree>
     <p:extLst>
       <p:ext uri="{BB962C8B-B14F-4D97-AF65-F5344CB8AC3E}">
-        <p14:creationId xmlns:p14="http://schemas.microsoft.com/office/powerpoint/2010/main" val="32837543"/>
+        <p14:creationId xmlns:p14="http://schemas.microsoft.com/office/powerpoint/2010/main" val="2767184646"/>
       </p:ext>
     </p:extLst>
   </p:cSld>
@@ -10783,8 +11254,8 @@
         </p:nvSpPr>
         <p:spPr>
           <a:xfrm>
-            <a:off x="563880" y="836664"/>
-            <a:ext cx="8016240" cy="3470171"/>
+            <a:off x="662940" y="1519444"/>
+            <a:ext cx="8016240" cy="1638900"/>
           </a:xfrm>
           <a:prstGeom prst="rect">
             <a:avLst/>
@@ -10801,6 +11272,9 @@
           <a:lstStyle/>
           <a:p>
             <a:pPr marL="9525" marR="58579" lvl="0" indent="0" algn="just" rtl="0">
+              <a:lnSpc>
+                <a:spcPct val="150000"/>
+              </a:lnSpc>
               <a:spcBef>
                 <a:spcPts val="0"/>
               </a:spcBef>
@@ -10810,113 +11284,25 @@
               <a:buNone/>
             </a:pPr>
             <a:r>
-              <a:rPr lang="en-US" b="1" dirty="0" err="1"/>
-              <a:t>Pregunta</a:t>
-            </a:r>
-            <a:r>
-              <a:rPr lang="en-US" b="1" dirty="0"/>
-              <a:t>: </a:t>
-            </a:r>
-            <a:r>
-              <a:rPr lang="en-US" dirty="0"/>
-              <a:t>What are the legal consequences arising from the construction of the wall being built by Israel, the occupying Power, in the Occupied Palestinian Territory, including in and around East Jerusalem, as described in the report of the Secretary-General, considering the rules and principles of international law, including the Fourth Geneva Convention of 1949, and relevant Security Council and General Assembly resolutions?</a:t>
-            </a:r>
-          </a:p>
-          <a:p>
-            <a:pPr marL="9525" marR="58579" lvl="0" indent="0" algn="just" rtl="0">
-              <a:spcBef>
-                <a:spcPts val="0"/>
-              </a:spcBef>
-              <a:spcAft>
-                <a:spcPts val="0"/>
-              </a:spcAft>
-              <a:buNone/>
-            </a:pPr>
-            <a:endParaRPr lang="en-US" dirty="0"/>
-          </a:p>
-          <a:p>
-            <a:pPr marL="9525" marR="58579" lvl="0" indent="0" algn="just" rtl="0">
-              <a:spcBef>
-                <a:spcPts val="0"/>
-              </a:spcBef>
-              <a:spcAft>
-                <a:spcPts val="0"/>
-              </a:spcAft>
-              <a:buNone/>
-            </a:pPr>
-            <a:r>
-              <a:rPr lang="en-US" b="1" dirty="0"/>
-              <a:t>Respuesta: </a:t>
-            </a:r>
-            <a:r>
-              <a:rPr lang="en-US" dirty="0"/>
-              <a:t>[CLS] what are the legal consequences arising from the construction of the wall being built by </a:t>
-            </a:r>
-            <a:r>
-              <a:rPr lang="en-US" dirty="0" err="1"/>
-              <a:t>israel</a:t>
-            </a:r>
-            <a:r>
-              <a:rPr lang="en-US" dirty="0"/>
-              <a:t> , the occupying power , in the occupied </a:t>
-            </a:r>
-            <a:r>
-              <a:rPr lang="en-US" dirty="0" err="1"/>
-              <a:t>palestinian</a:t>
-            </a:r>
-            <a:r>
-              <a:rPr lang="en-US" dirty="0"/>
-              <a:t> territory , including in and around east </a:t>
-            </a:r>
-            <a:r>
-              <a:rPr lang="en-US" dirty="0" err="1"/>
-              <a:t>jerusalem</a:t>
-            </a:r>
-            <a:r>
-              <a:rPr lang="en-US" dirty="0"/>
-              <a:t> , as described in the report of the secretary - general , considering the rules and principles of international law , including the fourth </a:t>
-            </a:r>
-            <a:r>
-              <a:rPr lang="en-US" dirty="0" err="1"/>
-              <a:t>geneva</a:t>
-            </a:r>
-            <a:r>
-              <a:rPr lang="en-US" dirty="0"/>
-              <a:t> convention of 1949 , and relevant security council and general assembly resolutions ? [SEP] have raised the further argument that the court should decline to exercise its jurisdiction because it does not have at its disposal the requisite facts and evidence to enable it to reach its conclusions . in particular , </a:t>
-            </a:r>
-            <a:r>
-              <a:rPr lang="en-US" dirty="0" err="1"/>
-              <a:t>israel</a:t>
-            </a:r>
-            <a:r>
-              <a:rPr lang="en-US" dirty="0"/>
-              <a:t> has contended , referring to the advisory opinion on t he interpretation of peace treaties with </a:t>
-            </a:r>
-            <a:r>
-              <a:rPr lang="en-US" dirty="0" err="1"/>
-              <a:t>bulgaria</a:t>
-            </a:r>
-            <a:r>
-              <a:rPr lang="en-US" dirty="0"/>
-              <a:t> , </a:t>
-            </a:r>
-            <a:r>
-              <a:rPr lang="en-US" dirty="0" err="1"/>
-              <a:t>hungary</a:t>
-            </a:r>
-            <a:r>
-              <a:rPr lang="en-US" dirty="0"/>
-              <a:t> and </a:t>
-            </a:r>
-            <a:r>
-              <a:rPr lang="en-US" dirty="0" err="1"/>
-              <a:t>romania</a:t>
-            </a:r>
-            <a:r>
-              <a:rPr lang="en-US" dirty="0"/>
-              <a:t> , that the court could not give an opinion on issues which raise questions of fact that cannot be elucidated without hearing all parties to the conflict . accord [SEP] </a:t>
-            </a:r>
-            <a:endParaRPr lang="es-MX" dirty="0"/>
+              <a:rPr lang="es-MX" dirty="0"/>
+              <a:t>Conjunto al modelo BERT que usamos para clasificación de secuencias en un conjunto de datos judiciales, pudimos hacer el montaje de un modelo de </a:t>
+            </a:r>
+            <a:r>
+              <a:rPr lang="es-MX" dirty="0" err="1"/>
+              <a:t>Question</a:t>
+            </a:r>
+            <a:r>
+              <a:rPr lang="es-MX" dirty="0"/>
+              <a:t> &amp; </a:t>
+            </a:r>
+            <a:r>
+              <a:rPr lang="es-MX" dirty="0" err="1"/>
+              <a:t>Answering</a:t>
+            </a:r>
+            <a:r>
+              <a:rPr lang="es-MX" dirty="0"/>
+              <a:t> (Q&amp;A) para responder preguntas específicas relacionadas con las opiniones consultivas de la Corte Internacional de Justicia (CIJ). Los resultados fueron satisfactorios para todos nosotros puesto que cumplimos con nuestro objetivo principal</a:t>
+            </a:r>
           </a:p>
         </p:txBody>
       </p:sp>
@@ -10928,7 +11314,7 @@
         </p:nvSpPr>
         <p:spPr>
           <a:xfrm>
-            <a:off x="510540" y="349617"/>
+            <a:off x="662940" y="585145"/>
             <a:ext cx="4572000" cy="338554"/>
           </a:xfrm>
           <a:prstGeom prst="rect">
@@ -10968,15 +11354,6 @@
                 <a:sym typeface="Helvetica Neue Light"/>
               </a:rPr>
               <a:t>Informe</a:t>
-            </a:r>
-            <a:r>
-              <a:rPr lang="es-ES" sz="1600" b="1" dirty="0">
-                <a:latin typeface="Helvetica Neue Light"/>
-                <a:ea typeface="Helvetica Neue Light"/>
-                <a:cs typeface="Helvetica Neue Light"/>
-                <a:sym typeface="Helvetica Neue Light"/>
-              </a:rPr>
-              <a:t> – Respuesta 1 Q&amp;A</a:t>
             </a:r>
             <a:endParaRPr sz="1600" b="1" i="0" u="none" strike="noStrike" cap="none" dirty="0">
               <a:solidFill>
@@ -10993,7 +11370,7 @@
     </p:spTree>
     <p:extLst>
       <p:ext uri="{BB962C8B-B14F-4D97-AF65-F5344CB8AC3E}">
-        <p14:creationId xmlns:p14="http://schemas.microsoft.com/office/powerpoint/2010/main" val="324133137"/>
+        <p14:creationId xmlns:p14="http://schemas.microsoft.com/office/powerpoint/2010/main" val="32837543"/>
       </p:ext>
     </p:extLst>
   </p:cSld>
@@ -11029,7 +11406,7 @@
         <p:spPr>
           <a:xfrm>
             <a:off x="563880" y="836664"/>
-            <a:ext cx="8016240" cy="2823840"/>
+            <a:ext cx="8016240" cy="3470171"/>
           </a:xfrm>
           <a:prstGeom prst="rect">
             <a:avLst/>
@@ -11095,7 +11472,31 @@
             </a:r>
             <a:r>
               <a:rPr lang="en-US" dirty="0"/>
-              <a:t>the rules and principles of international law , including the fourth </a:t>
+              <a:t>[CLS] what are the legal consequences arising from the construction of the wall being built by </a:t>
+            </a:r>
+            <a:r>
+              <a:rPr lang="en-US" dirty="0" err="1"/>
+              <a:t>israel</a:t>
+            </a:r>
+            <a:r>
+              <a:rPr lang="en-US" dirty="0"/>
+              <a:t> , the occupying power , in the occupied </a:t>
+            </a:r>
+            <a:r>
+              <a:rPr lang="en-US" dirty="0" err="1"/>
+              <a:t>palestinian</a:t>
+            </a:r>
+            <a:r>
+              <a:rPr lang="en-US" dirty="0"/>
+              <a:t> territory , including in and around east </a:t>
+            </a:r>
+            <a:r>
+              <a:rPr lang="en-US" dirty="0" err="1"/>
+              <a:t>jerusalem</a:t>
+            </a:r>
+            <a:r>
+              <a:rPr lang="en-US" dirty="0"/>
+              <a:t> , as described in the report of the secretary - general , considering the rules and principles of international law , including the fourth </a:t>
             </a:r>
             <a:r>
               <a:rPr lang="en-US" dirty="0" err="1"/>
@@ -11103,47 +11504,39 @@
             </a:r>
             <a:r>
               <a:rPr lang="en-US" dirty="0"/>
-              <a:t> convention of 1949 , and relevant security council and general assembly resolutions ? k in time , the latest provisions relating thereto having been incorporated into article 62 of the treaty of berlin of 13 </a:t>
+              <a:t> convention of 1949 , and relevant security council and general assembly resolutions ? [SEP] have raised the further argument that the court should decline to exercise its jurisdiction because it does not have at its disposal the requisite facts and evidence to enable it to reach its conclusions . in particular , </a:t>
             </a:r>
             <a:r>
               <a:rPr lang="en-US" dirty="0" err="1"/>
-              <a:t>july</a:t>
+              <a:t>israel</a:t>
             </a:r>
             <a:r>
               <a:rPr lang="en-US" dirty="0"/>
-              <a:t> 1878 . the mandate for </a:t>
+              <a:t> has contended , referring to the advisory opinion on t he interpretation of peace treaties with </a:t>
             </a:r>
             <a:r>
               <a:rPr lang="en-US" dirty="0" err="1"/>
-              <a:t>palestine</a:t>
+              <a:t>bulgaria</a:t>
             </a:r>
             <a:r>
               <a:rPr lang="en-US" dirty="0"/>
-              <a:t> given to the </a:t>
+              <a:t> , </a:t>
             </a:r>
             <a:r>
               <a:rPr lang="en-US" dirty="0" err="1"/>
-              <a:t>british</a:t>
+              <a:t>hungary</a:t>
             </a:r>
             <a:r>
               <a:rPr lang="en-US" dirty="0"/>
-              <a:t> government on 24 </a:t>
+              <a:t> and </a:t>
             </a:r>
             <a:r>
               <a:rPr lang="en-US" dirty="0" err="1"/>
-              <a:t>july</a:t>
+              <a:t>romania</a:t>
             </a:r>
             <a:r>
               <a:rPr lang="en-US" dirty="0"/>
-              <a:t> 1922 included an article 13 , under which : all responsibility in connection with the holy places and religious buildings or sites in </a:t>
-            </a:r>
-            <a:r>
-              <a:rPr lang="en-US" dirty="0" err="1"/>
-              <a:t>palestine</a:t>
-            </a:r>
-            <a:r>
-              <a:rPr lang="en-US" dirty="0"/>
-              <a:t> , including that of preserving existing rights and of securing free access to the holy places , religious buildings and sites and the free exercise of worship</a:t>
+              <a:t> , that the court could not give an opinion on issues which raise questions of fact that cannot be elucidated without hearing all parties to the conflict . accord [SEP] </a:t>
             </a:r>
             <a:endParaRPr lang="es-MX" dirty="0"/>
           </a:p>
@@ -11205,7 +11598,7 @@
                 <a:cs typeface="Helvetica Neue Light"/>
                 <a:sym typeface="Helvetica Neue Light"/>
               </a:rPr>
-              <a:t> – Respuesta 2 Q&amp;A</a:t>
+              <a:t> – Respuesta 1 Q&amp;A</a:t>
             </a:r>
             <a:endParaRPr sz="1600" b="1" i="0" u="none" strike="noStrike" cap="none" dirty="0">
               <a:solidFill>
@@ -11222,7 +11615,7 @@
     </p:spTree>
     <p:extLst>
       <p:ext uri="{BB962C8B-B14F-4D97-AF65-F5344CB8AC3E}">
-        <p14:creationId xmlns:p14="http://schemas.microsoft.com/office/powerpoint/2010/main" val="3867588320"/>
+        <p14:creationId xmlns:p14="http://schemas.microsoft.com/office/powerpoint/2010/main" val="324133137"/>
       </p:ext>
     </p:extLst>
   </p:cSld>
@@ -11257,8 +11650,8 @@
         </p:nvSpPr>
         <p:spPr>
           <a:xfrm>
-            <a:off x="662940" y="1441012"/>
-            <a:ext cx="8016240" cy="1373699"/>
+            <a:off x="563880" y="836664"/>
+            <a:ext cx="8016240" cy="2823840"/>
           </a:xfrm>
           <a:prstGeom prst="rect">
             <a:avLst/>
@@ -11275,11 +11668,8 @@
           <a:lstStyle/>
           <a:p>
             <a:pPr marL="9525" marR="58579" lvl="0" indent="0" algn="just" rtl="0">
-              <a:lnSpc>
-                <a:spcPct val="204642"/>
-              </a:lnSpc>
-              <a:spcBef>
-                <a:spcPts val="180"/>
+              <a:spcBef>
+                <a:spcPts val="0"/>
               </a:spcBef>
               <a:spcAft>
                 <a:spcPts val="0"/>
@@ -11287,26 +11677,97 @@
               <a:buNone/>
             </a:pPr>
             <a:r>
-              <a:rPr lang="es-MX" sz="1400" b="0" i="0" u="none" strike="noStrike" cap="none" dirty="0">
-                <a:solidFill>
-                  <a:srgbClr val="000000"/>
-                </a:solidFill>
-                <a:latin typeface="Helvetica Neue Light"/>
-                <a:ea typeface="Helvetica Neue Light"/>
-                <a:cs typeface="Helvetica Neue Light"/>
-                <a:sym typeface="Helvetica Neue Light"/>
-              </a:rPr>
-              <a:t>En términos generales, el modelo cumplió con nuestras expectativas para el análisis de los datos judiciales. Sin embargo, reconocemos la necesidad de enriquecerlo con una mayor cantidad de datos para asegurar que pueda generalizar de manera más precisa los casos negativos.</a:t>
-            </a:r>
-            <a:endParaRPr sz="1400" b="0" i="0" u="none" strike="noStrike" cap="none" dirty="0">
-              <a:solidFill>
-                <a:srgbClr val="000000"/>
-              </a:solidFill>
-              <a:latin typeface="Helvetica Neue Light"/>
-              <a:ea typeface="Helvetica Neue Light"/>
-              <a:cs typeface="Helvetica Neue Light"/>
-              <a:sym typeface="Helvetica Neue Light"/>
-            </a:endParaRPr>
+              <a:rPr lang="en-US" b="1" dirty="0" err="1"/>
+              <a:t>Pregunta</a:t>
+            </a:r>
+            <a:r>
+              <a:rPr lang="en-US" b="1" dirty="0"/>
+              <a:t>: </a:t>
+            </a:r>
+            <a:r>
+              <a:rPr lang="en-US" dirty="0"/>
+              <a:t>What are the legal consequences arising from the construction of the wall being built by Israel, the occupying Power, in the Occupied Palestinian Territory, including in and around East Jerusalem, as described in the report of the Secretary-General, considering the rules and principles of international law, including the Fourth Geneva Convention of 1949, and relevant Security Council and General Assembly resolutions?</a:t>
+            </a:r>
+          </a:p>
+          <a:p>
+            <a:pPr marL="9525" marR="58579" lvl="0" indent="0" algn="just" rtl="0">
+              <a:spcBef>
+                <a:spcPts val="0"/>
+              </a:spcBef>
+              <a:spcAft>
+                <a:spcPts val="0"/>
+              </a:spcAft>
+              <a:buNone/>
+            </a:pPr>
+            <a:endParaRPr lang="en-US" dirty="0"/>
+          </a:p>
+          <a:p>
+            <a:pPr marL="9525" marR="58579" lvl="0" indent="0" algn="just" rtl="0">
+              <a:spcBef>
+                <a:spcPts val="0"/>
+              </a:spcBef>
+              <a:spcAft>
+                <a:spcPts val="0"/>
+              </a:spcAft>
+              <a:buNone/>
+            </a:pPr>
+            <a:r>
+              <a:rPr lang="en-US" b="1" dirty="0"/>
+              <a:t>Respuesta: </a:t>
+            </a:r>
+            <a:r>
+              <a:rPr lang="en-US" dirty="0"/>
+              <a:t>the rules and principles of international law , including the fourth </a:t>
+            </a:r>
+            <a:r>
+              <a:rPr lang="en-US" dirty="0" err="1"/>
+              <a:t>geneva</a:t>
+            </a:r>
+            <a:r>
+              <a:rPr lang="en-US" dirty="0"/>
+              <a:t> convention of 1949 , and relevant security council and general assembly resolutions ? k in time , the latest provisions relating thereto having been incorporated into article 62 of the treaty of berlin of 13 </a:t>
+            </a:r>
+            <a:r>
+              <a:rPr lang="en-US" dirty="0" err="1"/>
+              <a:t>july</a:t>
+            </a:r>
+            <a:r>
+              <a:rPr lang="en-US" dirty="0"/>
+              <a:t> 1878 . the mandate for </a:t>
+            </a:r>
+            <a:r>
+              <a:rPr lang="en-US" dirty="0" err="1"/>
+              <a:t>palestine</a:t>
+            </a:r>
+            <a:r>
+              <a:rPr lang="en-US" dirty="0"/>
+              <a:t> given to the </a:t>
+            </a:r>
+            <a:r>
+              <a:rPr lang="en-US" dirty="0" err="1"/>
+              <a:t>british</a:t>
+            </a:r>
+            <a:r>
+              <a:rPr lang="en-US" dirty="0"/>
+              <a:t> government on 24 </a:t>
+            </a:r>
+            <a:r>
+              <a:rPr lang="en-US" dirty="0" err="1"/>
+              <a:t>july</a:t>
+            </a:r>
+            <a:r>
+              <a:rPr lang="en-US" dirty="0"/>
+              <a:t> 1922 included an article 13 , under which : all responsibility in connection with the holy places and religious buildings or sites in </a:t>
+            </a:r>
+            <a:r>
+              <a:rPr lang="en-US" dirty="0" err="1"/>
+              <a:t>palestine</a:t>
+            </a:r>
+            <a:r>
+              <a:rPr lang="en-US" dirty="0"/>
+              <a:t> , including that of preserving existing rights and of securing free access to the holy places , religious buildings and sites and the free exercise of worship</a:t>
+            </a:r>
+            <a:endParaRPr lang="es-MX" dirty="0"/>
           </a:p>
         </p:txBody>
       </p:sp>
@@ -11318,7 +11779,7 @@
         </p:nvSpPr>
         <p:spPr>
           <a:xfrm>
-            <a:off x="662940" y="585145"/>
+            <a:off x="510540" y="349617"/>
             <a:ext cx="4572000" cy="338554"/>
           </a:xfrm>
           <a:prstGeom prst="rect">
@@ -11357,7 +11818,16 @@
                 <a:cs typeface="Helvetica Neue Light"/>
                 <a:sym typeface="Helvetica Neue Light"/>
               </a:rPr>
-              <a:t>Conclusiones</a:t>
+              <a:t>Informe</a:t>
+            </a:r>
+            <a:r>
+              <a:rPr lang="es-ES" sz="1600" b="1" dirty="0">
+                <a:latin typeface="Helvetica Neue Light"/>
+                <a:ea typeface="Helvetica Neue Light"/>
+                <a:cs typeface="Helvetica Neue Light"/>
+                <a:sym typeface="Helvetica Neue Light"/>
+              </a:rPr>
+              <a:t> – Respuesta 2 Q&amp;A</a:t>
             </a:r>
             <a:endParaRPr sz="1600" b="1" i="0" u="none" strike="noStrike" cap="none" dirty="0">
               <a:solidFill>
@@ -11374,7 +11844,7 @@
     </p:spTree>
     <p:extLst>
       <p:ext uri="{BB962C8B-B14F-4D97-AF65-F5344CB8AC3E}">
-        <p14:creationId xmlns:p14="http://schemas.microsoft.com/office/powerpoint/2010/main" val="15957449"/>
+        <p14:creationId xmlns:p14="http://schemas.microsoft.com/office/powerpoint/2010/main" val="3867588320"/>
       </p:ext>
     </p:extLst>
   </p:cSld>
@@ -11409,8 +11879,8 @@
         </p:nvSpPr>
         <p:spPr>
           <a:xfrm>
-            <a:off x="662940" y="1309393"/>
-            <a:ext cx="8016240" cy="2231370"/>
+            <a:off x="662940" y="1441012"/>
+            <a:ext cx="8016240" cy="1373699"/>
           </a:xfrm>
           <a:prstGeom prst="rect">
             <a:avLst/>
@@ -11426,13 +11896,20 @@
           </a:bodyPr>
           <a:lstStyle/>
           <a:p>
-            <a:pPr marL="9525" marR="58579" algn="just">
+            <a:pPr marL="9525" marR="58579" lvl="0" indent="0" algn="just" rtl="0">
               <a:lnSpc>
                 <a:spcPct val="204642"/>
               </a:lnSpc>
+              <a:spcBef>
+                <a:spcPts val="180"/>
+              </a:spcBef>
+              <a:spcAft>
+                <a:spcPts val="0"/>
+              </a:spcAft>
+              <a:buNone/>
             </a:pPr>
             <a:r>
-              <a:rPr lang="es-ES" sz="1400" b="1" i="0" u="none" strike="noStrike" cap="none" dirty="0">
+              <a:rPr lang="es-MX" sz="1400" b="0" i="0" u="none" strike="noStrike" cap="none" dirty="0">
                 <a:solidFill>
                   <a:srgbClr val="000000"/>
                 </a:solidFill>
@@ -11441,118 +11918,17 @@
                 <a:cs typeface="Helvetica Neue Light"/>
                 <a:sym typeface="Helvetica Neue Light"/>
               </a:rPr>
-              <a:t>Biblioteca Digital de Naciones Unidas</a:t>
-            </a:r>
-            <a:r>
-              <a:rPr lang="es-ES" sz="1400" b="0" i="0" u="none" strike="noStrike" cap="none" dirty="0">
-                <a:solidFill>
-                  <a:srgbClr val="000000"/>
-                </a:solidFill>
-                <a:latin typeface="Helvetica Neue Light"/>
-                <a:ea typeface="Helvetica Neue Light"/>
-                <a:cs typeface="Helvetica Neue Light"/>
-                <a:sym typeface="Helvetica Neue Light"/>
-              </a:rPr>
-              <a:t> </a:t>
-            </a:r>
-            <a:r>
-              <a:rPr lang="es-ES" dirty="0">
-                <a:sym typeface="Helvetica Neue Light"/>
-                <a:hlinkClick r:id="rId3"/>
-              </a:rPr>
-              <a:t>https://digitallibrary.un.org/?ln=en</a:t>
-            </a:r>
-            <a:endParaRPr lang="es-ES" dirty="0">
+              <a:t>En términos generales, el modelo cumplió con nuestras expectativas para el análisis de los datos judiciales. Sin embargo, reconocemos la necesidad de enriquecerlo con una mayor cantidad de datos para asegurar que pueda generalizar de manera más precisa los casos negativos.</a:t>
+            </a:r>
+            <a:endParaRPr sz="1400" b="0" i="0" u="none" strike="noStrike" cap="none" dirty="0">
+              <a:solidFill>
+                <a:srgbClr val="000000"/>
+              </a:solidFill>
+              <a:latin typeface="Helvetica Neue Light"/>
+              <a:ea typeface="Helvetica Neue Light"/>
+              <a:cs typeface="Helvetica Neue Light"/>
               <a:sym typeface="Helvetica Neue Light"/>
             </a:endParaRPr>
-          </a:p>
-          <a:p>
-            <a:pPr marL="9525" marR="58579" lvl="0" algn="just" rtl="0">
-              <a:lnSpc>
-                <a:spcPct val="204642"/>
-              </a:lnSpc>
-              <a:spcBef>
-                <a:spcPts val="0"/>
-              </a:spcBef>
-              <a:spcAft>
-                <a:spcPts val="0"/>
-              </a:spcAft>
-            </a:pPr>
-            <a:r>
-              <a:rPr lang="es-ES" b="1" dirty="0">
-                <a:latin typeface="Helvetica Neue Light"/>
-                <a:sym typeface="Helvetica Neue Light"/>
-              </a:rPr>
-              <a:t>Corte Internacional de Justicia</a:t>
-            </a:r>
-            <a:r>
-              <a:rPr lang="es-ES" dirty="0">
-                <a:latin typeface="Helvetica Neue Light"/>
-                <a:sym typeface="Helvetica Neue Light"/>
-              </a:rPr>
-              <a:t>	</a:t>
-            </a:r>
-            <a:r>
-              <a:rPr lang="es-UY" dirty="0">
-                <a:hlinkClick r:id="rId4"/>
-              </a:rPr>
-              <a:t>https://www.icj-cij.org/advisory-proceedings</a:t>
-            </a:r>
-            <a:endParaRPr lang="es-UY" dirty="0"/>
-          </a:p>
-          <a:p>
-            <a:pPr marL="9525" marR="58579" lvl="4" algn="just">
-              <a:lnSpc>
-                <a:spcPct val="204642"/>
-              </a:lnSpc>
-            </a:pPr>
-            <a:r>
-              <a:rPr lang="es-UY" dirty="0"/>
-              <a:t>			</a:t>
-            </a:r>
-            <a:r>
-              <a:rPr lang="es-UY" dirty="0">
-                <a:hlinkClick r:id="rId5"/>
-              </a:rPr>
-              <a:t>https://www.icj-cij.org/case/131/written-proceedings</a:t>
-            </a:r>
-            <a:endParaRPr lang="es-UY" dirty="0"/>
-          </a:p>
-          <a:p>
-            <a:pPr marL="9525" marR="58579" lvl="4" algn="just">
-              <a:lnSpc>
-                <a:spcPct val="204642"/>
-              </a:lnSpc>
-            </a:pPr>
-            <a:r>
-              <a:rPr lang="es-UY" dirty="0"/>
-              <a:t>			</a:t>
-            </a:r>
-            <a:r>
-              <a:rPr lang="es-UY" dirty="0">
-                <a:hlinkClick r:id="rId6"/>
-              </a:rPr>
-              <a:t>https://www.icj-cij.org/case/131/oral-proceedings</a:t>
-            </a:r>
-            <a:endParaRPr lang="es-UY" dirty="0"/>
-          </a:p>
-          <a:p>
-            <a:pPr marL="9525" marR="58579" lvl="4" algn="just">
-              <a:lnSpc>
-                <a:spcPct val="204642"/>
-              </a:lnSpc>
-            </a:pPr>
-            <a:r>
-              <a:rPr lang="es-UY" dirty="0"/>
-              <a:t>			</a:t>
-            </a:r>
-            <a:r>
-              <a:rPr lang="es-UY" dirty="0">
-                <a:hlinkClick r:id="rId7"/>
-              </a:rPr>
-              <a:t>https://www.icj-cij.org/case/131/advisory-opinions</a:t>
-            </a:r>
-            <a:endParaRPr dirty="0"/>
           </a:p>
         </p:txBody>
       </p:sp>
@@ -11603,7 +11979,7 @@
                 <a:cs typeface="Helvetica Neue Light"/>
                 <a:sym typeface="Helvetica Neue Light"/>
               </a:rPr>
-              <a:t>Materiales de interés</a:t>
+              <a:t>Conclusiones</a:t>
             </a:r>
             <a:endParaRPr sz="1600" b="1" i="0" u="none" strike="noStrike" cap="none" dirty="0">
               <a:solidFill>
@@ -11620,7 +11996,7 @@
     </p:spTree>
     <p:extLst>
       <p:ext uri="{BB962C8B-B14F-4D97-AF65-F5344CB8AC3E}">
-        <p14:creationId xmlns:p14="http://schemas.microsoft.com/office/powerpoint/2010/main" val="2993859501"/>
+        <p14:creationId xmlns:p14="http://schemas.microsoft.com/office/powerpoint/2010/main" val="15957449"/>
       </p:ext>
     </p:extLst>
   </p:cSld>
@@ -11649,6 +12025,252 @@
       </p:grpSpPr>
       <p:sp>
         <p:nvSpPr>
+          <p:cNvPr id="26" name="Google Shape;26;p6"/>
+          <p:cNvSpPr txBox="1"/>
+          <p:nvPr/>
+        </p:nvSpPr>
+        <p:spPr>
+          <a:xfrm>
+            <a:off x="662940" y="1309393"/>
+            <a:ext cx="8016240" cy="2231370"/>
+          </a:xfrm>
+          <a:prstGeom prst="rect">
+            <a:avLst/>
+          </a:prstGeom>
+          <a:noFill/>
+          <a:ln>
+            <a:noFill/>
+          </a:ln>
+        </p:spPr>
+        <p:txBody>
+          <a:bodyPr spcFirstLastPara="1" wrap="square" lIns="0" tIns="22850" rIns="0" bIns="0" anchor="t" anchorCtr="0">
+            <a:spAutoFit/>
+          </a:bodyPr>
+          <a:lstStyle/>
+          <a:p>
+            <a:pPr marL="9525" marR="58579" algn="just">
+              <a:lnSpc>
+                <a:spcPct val="204642"/>
+              </a:lnSpc>
+            </a:pPr>
+            <a:r>
+              <a:rPr lang="es-ES" sz="1400" b="1" i="0" u="none" strike="noStrike" cap="none" dirty="0">
+                <a:solidFill>
+                  <a:srgbClr val="000000"/>
+                </a:solidFill>
+                <a:latin typeface="Helvetica Neue Light"/>
+                <a:ea typeface="Helvetica Neue Light"/>
+                <a:cs typeface="Helvetica Neue Light"/>
+                <a:sym typeface="Helvetica Neue Light"/>
+              </a:rPr>
+              <a:t>Biblioteca Digital de Naciones Unidas</a:t>
+            </a:r>
+            <a:r>
+              <a:rPr lang="es-ES" sz="1400" b="0" i="0" u="none" strike="noStrike" cap="none" dirty="0">
+                <a:solidFill>
+                  <a:srgbClr val="000000"/>
+                </a:solidFill>
+                <a:latin typeface="Helvetica Neue Light"/>
+                <a:ea typeface="Helvetica Neue Light"/>
+                <a:cs typeface="Helvetica Neue Light"/>
+                <a:sym typeface="Helvetica Neue Light"/>
+              </a:rPr>
+              <a:t> </a:t>
+            </a:r>
+            <a:r>
+              <a:rPr lang="es-ES" dirty="0">
+                <a:sym typeface="Helvetica Neue Light"/>
+                <a:hlinkClick r:id="rId3"/>
+              </a:rPr>
+              <a:t>https://digitallibrary.un.org/?ln=en</a:t>
+            </a:r>
+            <a:endParaRPr lang="es-ES" dirty="0">
+              <a:sym typeface="Helvetica Neue Light"/>
+            </a:endParaRPr>
+          </a:p>
+          <a:p>
+            <a:pPr marL="9525" marR="58579" lvl="0" algn="just" rtl="0">
+              <a:lnSpc>
+                <a:spcPct val="204642"/>
+              </a:lnSpc>
+              <a:spcBef>
+                <a:spcPts val="0"/>
+              </a:spcBef>
+              <a:spcAft>
+                <a:spcPts val="0"/>
+              </a:spcAft>
+            </a:pPr>
+            <a:r>
+              <a:rPr lang="es-ES" b="1" dirty="0">
+                <a:latin typeface="Helvetica Neue Light"/>
+                <a:sym typeface="Helvetica Neue Light"/>
+              </a:rPr>
+              <a:t>Corte Internacional de Justicia</a:t>
+            </a:r>
+            <a:r>
+              <a:rPr lang="es-ES" dirty="0">
+                <a:latin typeface="Helvetica Neue Light"/>
+                <a:sym typeface="Helvetica Neue Light"/>
+              </a:rPr>
+              <a:t>	</a:t>
+            </a:r>
+            <a:r>
+              <a:rPr lang="es-UY" dirty="0">
+                <a:hlinkClick r:id="rId4"/>
+              </a:rPr>
+              <a:t>https://www.icj-cij.org/advisory-proceedings</a:t>
+            </a:r>
+            <a:endParaRPr lang="es-UY" dirty="0"/>
+          </a:p>
+          <a:p>
+            <a:pPr marL="9525" marR="58579" lvl="4" algn="just">
+              <a:lnSpc>
+                <a:spcPct val="204642"/>
+              </a:lnSpc>
+            </a:pPr>
+            <a:r>
+              <a:rPr lang="es-UY" dirty="0"/>
+              <a:t>			</a:t>
+            </a:r>
+            <a:r>
+              <a:rPr lang="es-UY" dirty="0">
+                <a:hlinkClick r:id="rId5"/>
+              </a:rPr>
+              <a:t>https://www.icj-cij.org/case/131/written-proceedings</a:t>
+            </a:r>
+            <a:endParaRPr lang="es-UY" dirty="0"/>
+          </a:p>
+          <a:p>
+            <a:pPr marL="9525" marR="58579" lvl="4" algn="just">
+              <a:lnSpc>
+                <a:spcPct val="204642"/>
+              </a:lnSpc>
+            </a:pPr>
+            <a:r>
+              <a:rPr lang="es-UY" dirty="0"/>
+              <a:t>			</a:t>
+            </a:r>
+            <a:r>
+              <a:rPr lang="es-UY" dirty="0">
+                <a:hlinkClick r:id="rId6"/>
+              </a:rPr>
+              <a:t>https://www.icj-cij.org/case/131/oral-proceedings</a:t>
+            </a:r>
+            <a:endParaRPr lang="es-UY" dirty="0"/>
+          </a:p>
+          <a:p>
+            <a:pPr marL="9525" marR="58579" lvl="4" algn="just">
+              <a:lnSpc>
+                <a:spcPct val="204642"/>
+              </a:lnSpc>
+            </a:pPr>
+            <a:r>
+              <a:rPr lang="es-UY" dirty="0"/>
+              <a:t>			</a:t>
+            </a:r>
+            <a:r>
+              <a:rPr lang="es-UY" dirty="0">
+                <a:hlinkClick r:id="rId7"/>
+              </a:rPr>
+              <a:t>https://www.icj-cij.org/case/131/advisory-opinions</a:t>
+            </a:r>
+            <a:endParaRPr dirty="0"/>
+          </a:p>
+        </p:txBody>
+      </p:sp>
+      <p:sp>
+        <p:nvSpPr>
+          <p:cNvPr id="27" name="Google Shape;27;p6"/>
+          <p:cNvSpPr txBox="1"/>
+          <p:nvPr/>
+        </p:nvSpPr>
+        <p:spPr>
+          <a:xfrm>
+            <a:off x="662940" y="585145"/>
+            <a:ext cx="4572000" cy="338554"/>
+          </a:xfrm>
+          <a:prstGeom prst="rect">
+            <a:avLst/>
+          </a:prstGeom>
+          <a:noFill/>
+          <a:ln>
+            <a:noFill/>
+          </a:ln>
+        </p:spPr>
+        <p:txBody>
+          <a:bodyPr spcFirstLastPara="1" wrap="square" lIns="91425" tIns="45700" rIns="91425" bIns="45700" anchor="t" anchorCtr="0">
+            <a:spAutoFit/>
+          </a:bodyPr>
+          <a:lstStyle/>
+          <a:p>
+            <a:pPr marL="0" marR="0" lvl="0" indent="0" algn="l" rtl="0">
+              <a:lnSpc>
+                <a:spcPct val="100000"/>
+              </a:lnSpc>
+              <a:spcBef>
+                <a:spcPts val="0"/>
+              </a:spcBef>
+              <a:spcAft>
+                <a:spcPts val="0"/>
+              </a:spcAft>
+              <a:buNone/>
+            </a:pPr>
+            <a:r>
+              <a:rPr lang="es-ES" sz="1600" b="1" i="0" u="none" strike="noStrike" cap="none" dirty="0">
+                <a:solidFill>
+                  <a:srgbClr val="000000"/>
+                </a:solidFill>
+                <a:latin typeface="Helvetica Neue Light"/>
+                <a:ea typeface="Helvetica Neue Light"/>
+                <a:cs typeface="Helvetica Neue Light"/>
+                <a:sym typeface="Helvetica Neue Light"/>
+              </a:rPr>
+              <a:t>Materiales de interés</a:t>
+            </a:r>
+            <a:endParaRPr sz="1600" b="1" i="0" u="none" strike="noStrike" cap="none" dirty="0">
+              <a:solidFill>
+                <a:srgbClr val="000000"/>
+              </a:solidFill>
+              <a:latin typeface="Helvetica Neue Light"/>
+              <a:ea typeface="Helvetica Neue Light"/>
+              <a:cs typeface="Helvetica Neue Light"/>
+              <a:sym typeface="Helvetica Neue Light"/>
+            </a:endParaRPr>
+          </a:p>
+        </p:txBody>
+      </p:sp>
+    </p:spTree>
+    <p:extLst>
+      <p:ext uri="{BB962C8B-B14F-4D97-AF65-F5344CB8AC3E}">
+        <p14:creationId xmlns:p14="http://schemas.microsoft.com/office/powerpoint/2010/main" val="2993859501"/>
+      </p:ext>
+    </p:extLst>
+  </p:cSld>
+  <p:clrMapOvr>
+    <a:masterClrMapping/>
+  </p:clrMapOvr>
+</p:sld>
+</file>
+
+<file path=ppt/slides/slide25.xml><?xml version="1.0" encoding="utf-8"?>
+<p:sld xmlns:a="http://schemas.openxmlformats.org/drawingml/2006/main" xmlns:r="http://schemas.openxmlformats.org/officeDocument/2006/relationships" xmlns:p="http://schemas.openxmlformats.org/presentationml/2006/main">
+  <p:cSld>
+    <p:spTree>
+      <p:nvGrpSpPr>
+        <p:cNvPr id="1" name="Shape 24"/>
+        <p:cNvGrpSpPr/>
+        <p:nvPr/>
+      </p:nvGrpSpPr>
+      <p:grpSpPr>
+        <a:xfrm>
+          <a:off x="0" y="0"/>
+          <a:ext cx="0" cy="0"/>
+          <a:chOff x="0" y="0"/>
+          <a:chExt cx="0" cy="0"/>
+        </a:xfrm>
+      </p:grpSpPr>
+      <p:sp>
+        <p:nvSpPr>
           <p:cNvPr id="27" name="Google Shape;27;p6"/>
           <p:cNvSpPr txBox="1"/>
           <p:nvPr/>
@@ -11773,7 +12395,7 @@
 </p:sld>
 </file>
 
-<file path=ppt/slides/slide25.xml><?xml version="1.0" encoding="utf-8"?>
+<file path=ppt/slides/slide26.xml><?xml version="1.0" encoding="utf-8"?>
 <p:sld xmlns:a="http://schemas.openxmlformats.org/drawingml/2006/main" xmlns:r="http://schemas.openxmlformats.org/officeDocument/2006/relationships" xmlns:p="http://schemas.openxmlformats.org/presentationml/2006/main">
   <p:cSld>
     <p:spTree>

</xml_diff>